<commit_message>
Added icons and graphics
</commit_message>
<xml_diff>
--- a/Logo/logom.pptx
+++ b/Logo/logom.pptx
@@ -6,6 +6,7 @@
   </p:sldMasterIdLst>
   <p:sldIdLst>
     <p:sldId id="256" r:id="rId2"/>
+    <p:sldId id="257" r:id="rId3"/>
   </p:sldIdLst>
   <p:sldSz cx="12192000" cy="6858000"/>
   <p:notesSz cx="6858000" cy="9144000"/>
@@ -104,6 +105,11 @@
       </a:defRPr>
     </a:lvl9pPr>
   </p:defaultTextStyle>
+  <p:extLst>
+    <p:ext uri="{EFAFB233-063F-42B5-8137-9DF3F51BA10A}">
+      <p15:sldGuideLst xmlns:p15="http://schemas.microsoft.com/office/powerpoint/2012/main"/>
+    </p:ext>
+  </p:extLst>
 </p:presentation>
 </file>
 
@@ -238,7 +244,7 @@
           <a:p>
             <a:fld id="{CAD5531C-C813-472C-81AA-335B8B326CFA}" type="datetimeFigureOut">
               <a:rPr lang="en-IN" smtClean="0"/>
-              <a:t>03-05-2017</a:t>
+              <a:t>23-06-2017</a:t>
             </a:fld>
             <a:endParaRPr lang="en-IN"/>
           </a:p>
@@ -408,7 +414,7 @@
           <a:p>
             <a:fld id="{CAD5531C-C813-472C-81AA-335B8B326CFA}" type="datetimeFigureOut">
               <a:rPr lang="en-IN" smtClean="0"/>
-              <a:t>03-05-2017</a:t>
+              <a:t>23-06-2017</a:t>
             </a:fld>
             <a:endParaRPr lang="en-IN"/>
           </a:p>
@@ -588,7 +594,7 @@
           <a:p>
             <a:fld id="{CAD5531C-C813-472C-81AA-335B8B326CFA}" type="datetimeFigureOut">
               <a:rPr lang="en-IN" smtClean="0"/>
-              <a:t>03-05-2017</a:t>
+              <a:t>23-06-2017</a:t>
             </a:fld>
             <a:endParaRPr lang="en-IN"/>
           </a:p>
@@ -758,7 +764,7 @@
           <a:p>
             <a:fld id="{CAD5531C-C813-472C-81AA-335B8B326CFA}" type="datetimeFigureOut">
               <a:rPr lang="en-IN" smtClean="0"/>
-              <a:t>03-05-2017</a:t>
+              <a:t>23-06-2017</a:t>
             </a:fld>
             <a:endParaRPr lang="en-IN"/>
           </a:p>
@@ -1004,7 +1010,7 @@
           <a:p>
             <a:fld id="{CAD5531C-C813-472C-81AA-335B8B326CFA}" type="datetimeFigureOut">
               <a:rPr lang="en-IN" smtClean="0"/>
-              <a:t>03-05-2017</a:t>
+              <a:t>23-06-2017</a:t>
             </a:fld>
             <a:endParaRPr lang="en-IN"/>
           </a:p>
@@ -1236,7 +1242,7 @@
           <a:p>
             <a:fld id="{CAD5531C-C813-472C-81AA-335B8B326CFA}" type="datetimeFigureOut">
               <a:rPr lang="en-IN" smtClean="0"/>
-              <a:t>03-05-2017</a:t>
+              <a:t>23-06-2017</a:t>
             </a:fld>
             <a:endParaRPr lang="en-IN"/>
           </a:p>
@@ -1603,7 +1609,7 @@
           <a:p>
             <a:fld id="{CAD5531C-C813-472C-81AA-335B8B326CFA}" type="datetimeFigureOut">
               <a:rPr lang="en-IN" smtClean="0"/>
-              <a:t>03-05-2017</a:t>
+              <a:t>23-06-2017</a:t>
             </a:fld>
             <a:endParaRPr lang="en-IN"/>
           </a:p>
@@ -1721,7 +1727,7 @@
           <a:p>
             <a:fld id="{CAD5531C-C813-472C-81AA-335B8B326CFA}" type="datetimeFigureOut">
               <a:rPr lang="en-IN" smtClean="0"/>
-              <a:t>03-05-2017</a:t>
+              <a:t>23-06-2017</a:t>
             </a:fld>
             <a:endParaRPr lang="en-IN"/>
           </a:p>
@@ -1816,7 +1822,7 @@
           <a:p>
             <a:fld id="{CAD5531C-C813-472C-81AA-335B8B326CFA}" type="datetimeFigureOut">
               <a:rPr lang="en-IN" smtClean="0"/>
-              <a:t>03-05-2017</a:t>
+              <a:t>23-06-2017</a:t>
             </a:fld>
             <a:endParaRPr lang="en-IN"/>
           </a:p>
@@ -2093,7 +2099,7 @@
           <a:p>
             <a:fld id="{CAD5531C-C813-472C-81AA-335B8B326CFA}" type="datetimeFigureOut">
               <a:rPr lang="en-IN" smtClean="0"/>
-              <a:t>03-05-2017</a:t>
+              <a:t>23-06-2017</a:t>
             </a:fld>
             <a:endParaRPr lang="en-IN"/>
           </a:p>
@@ -2346,7 +2352,7 @@
           <a:p>
             <a:fld id="{CAD5531C-C813-472C-81AA-335B8B326CFA}" type="datetimeFigureOut">
               <a:rPr lang="en-IN" smtClean="0"/>
-              <a:t>03-05-2017</a:t>
+              <a:t>23-06-2017</a:t>
             </a:fld>
             <a:endParaRPr lang="en-IN"/>
           </a:p>
@@ -2411,9 +2417,12 @@
 <p:sldMaster xmlns:a="http://schemas.openxmlformats.org/drawingml/2006/main" xmlns:r="http://schemas.openxmlformats.org/officeDocument/2006/relationships" xmlns:p="http://schemas.openxmlformats.org/presentationml/2006/main">
   <p:cSld>
     <p:bg>
-      <p:bgRef idx="1001">
-        <a:schemeClr val="bg1"/>
-      </p:bgRef>
+      <p:bgPr>
+        <a:solidFill>
+          <a:schemeClr val="tx1"/>
+        </a:solidFill>
+        <a:effectLst/>
+      </p:bgPr>
     </p:bg>
     <p:spTree>
       <p:nvGrpSpPr>
@@ -2559,7 +2568,7 @@
           <a:p>
             <a:fld id="{CAD5531C-C813-472C-81AA-335B8B326CFA}" type="datetimeFigureOut">
               <a:rPr lang="en-IN" smtClean="0"/>
-              <a:t>03-05-2017</a:t>
+              <a:t>23-06-2017</a:t>
             </a:fld>
             <a:endParaRPr lang="en-IN"/>
           </a:p>
@@ -3088,6 +3097,847 @@
 </p:sld>
 </file>
 
+<file path=ppt/slides/slide2.xml><?xml version="1.0" encoding="utf-8"?>
+<p:sld xmlns:a="http://schemas.openxmlformats.org/drawingml/2006/main" xmlns:r="http://schemas.openxmlformats.org/officeDocument/2006/relationships" xmlns:p="http://schemas.openxmlformats.org/presentationml/2006/main">
+  <p:cSld>
+    <p:spTree>
+      <p:nvGrpSpPr>
+        <p:cNvPr id="1" name=""/>
+        <p:cNvGrpSpPr/>
+        <p:nvPr/>
+      </p:nvGrpSpPr>
+      <p:grpSpPr>
+        <a:xfrm>
+          <a:off x="0" y="0"/>
+          <a:ext cx="0" cy="0"/>
+          <a:chOff x="0" y="0"/>
+          <a:chExt cx="0" cy="0"/>
+        </a:xfrm>
+      </p:grpSpPr>
+      <p:pic>
+        <p:nvPicPr>
+          <p:cNvPr id="3" name="Picture 2"/>
+          <p:cNvPicPr>
+            <a:picLocks noChangeAspect="1"/>
+          </p:cNvPicPr>
+          <p:nvPr/>
+        </p:nvPicPr>
+        <p:blipFill>
+          <a:blip r:embed="rId2" cstate="print">
+            <a:biLevel thresh="25000"/>
+            <a:extLst>
+              <a:ext uri="{28A0092B-C50C-407E-A947-70E740481C1C}">
+                <a14:useLocalDpi xmlns:a14="http://schemas.microsoft.com/office/drawing/2010/main" val="0"/>
+              </a:ext>
+            </a:extLst>
+          </a:blip>
+          <a:stretch>
+            <a:fillRect/>
+          </a:stretch>
+        </p:blipFill>
+        <p:spPr>
+          <a:xfrm>
+            <a:off x="5335455" y="2198102"/>
+            <a:ext cx="118378" cy="118378"/>
+          </a:xfrm>
+          <a:prstGeom prst="rect">
+            <a:avLst/>
+          </a:prstGeom>
+        </p:spPr>
+      </p:pic>
+      <p:pic>
+        <p:nvPicPr>
+          <p:cNvPr id="5" name="Picture 4"/>
+          <p:cNvPicPr>
+            <a:picLocks noChangeAspect="1"/>
+          </p:cNvPicPr>
+          <p:nvPr/>
+        </p:nvPicPr>
+        <p:blipFill>
+          <a:blip r:embed="rId3" cstate="print">
+            <a:biLevel thresh="25000"/>
+            <a:extLst>
+              <a:ext uri="{BEBA8EAE-BF5A-486C-A8C5-ECC9F3942E4B}">
+                <a14:imgProps xmlns:a14="http://schemas.microsoft.com/office/drawing/2010/main">
+                  <a14:imgLayer r:embed="rId4">
+                    <a14:imgEffect>
+                      <a14:artisticPhotocopy/>
+                    </a14:imgEffect>
+                  </a14:imgLayer>
+                </a14:imgProps>
+              </a:ext>
+              <a:ext uri="{28A0092B-C50C-407E-A947-70E740481C1C}">
+                <a14:useLocalDpi xmlns:a14="http://schemas.microsoft.com/office/drawing/2010/main" val="0"/>
+              </a:ext>
+            </a:extLst>
+          </a:blip>
+          <a:stretch>
+            <a:fillRect/>
+          </a:stretch>
+        </p:blipFill>
+        <p:spPr>
+          <a:xfrm>
+            <a:off x="5718767" y="2198102"/>
+            <a:ext cx="118378" cy="118378"/>
+          </a:xfrm>
+          <a:prstGeom prst="rect">
+            <a:avLst/>
+          </a:prstGeom>
+        </p:spPr>
+      </p:pic>
+      <p:pic>
+        <p:nvPicPr>
+          <p:cNvPr id="6" name="Picture 5"/>
+          <p:cNvPicPr>
+            <a:picLocks noChangeAspect="1"/>
+          </p:cNvPicPr>
+          <p:nvPr/>
+        </p:nvPicPr>
+        <p:blipFill>
+          <a:blip r:embed="rId5" cstate="print">
+            <a:biLevel thresh="50000"/>
+            <a:extLst>
+              <a:ext uri="{BEBA8EAE-BF5A-486C-A8C5-ECC9F3942E4B}">
+                <a14:imgProps xmlns:a14="http://schemas.microsoft.com/office/drawing/2010/main">
+                  <a14:imgLayer r:embed="rId6">
+                    <a14:imgEffect>
+                      <a14:artisticPhotocopy/>
+                    </a14:imgEffect>
+                  </a14:imgLayer>
+                </a14:imgProps>
+              </a:ext>
+              <a:ext uri="{28A0092B-C50C-407E-A947-70E740481C1C}">
+                <a14:useLocalDpi xmlns:a14="http://schemas.microsoft.com/office/drawing/2010/main" val="0"/>
+              </a:ext>
+            </a:extLst>
+          </a:blip>
+          <a:stretch>
+            <a:fillRect/>
+          </a:stretch>
+        </p:blipFill>
+        <p:spPr>
+          <a:xfrm>
+            <a:off x="6040577" y="2198102"/>
+            <a:ext cx="123004" cy="123004"/>
+          </a:xfrm>
+          <a:prstGeom prst="rect">
+            <a:avLst/>
+          </a:prstGeom>
+        </p:spPr>
+      </p:pic>
+      <p:pic>
+        <p:nvPicPr>
+          <p:cNvPr id="7" name="Picture 6"/>
+          <p:cNvPicPr>
+            <a:picLocks noChangeAspect="1"/>
+          </p:cNvPicPr>
+          <p:nvPr/>
+        </p:nvPicPr>
+        <p:blipFill>
+          <a:blip r:embed="rId7" cstate="print">
+            <a:biLevel thresh="50000"/>
+            <a:extLst>
+              <a:ext uri="{BEBA8EAE-BF5A-486C-A8C5-ECC9F3942E4B}">
+                <a14:imgProps xmlns:a14="http://schemas.microsoft.com/office/drawing/2010/main">
+                  <a14:imgLayer r:embed="rId8">
+                    <a14:imgEffect>
+                      <a14:artisticPhotocopy/>
+                    </a14:imgEffect>
+                  </a14:imgLayer>
+                </a14:imgProps>
+              </a:ext>
+              <a:ext uri="{28A0092B-C50C-407E-A947-70E740481C1C}">
+                <a14:useLocalDpi xmlns:a14="http://schemas.microsoft.com/office/drawing/2010/main" val="0"/>
+              </a:ext>
+            </a:extLst>
+          </a:blip>
+          <a:stretch>
+            <a:fillRect/>
+          </a:stretch>
+        </p:blipFill>
+        <p:spPr>
+          <a:xfrm>
+            <a:off x="5047464" y="2199129"/>
+            <a:ext cx="122230" cy="122230"/>
+          </a:xfrm>
+          <a:prstGeom prst="rect">
+            <a:avLst/>
+          </a:prstGeom>
+        </p:spPr>
+      </p:pic>
+      <p:pic>
+        <p:nvPicPr>
+          <p:cNvPr id="8" name="Picture 7"/>
+          <p:cNvPicPr>
+            <a:picLocks noChangeAspect="1"/>
+          </p:cNvPicPr>
+          <p:nvPr/>
+        </p:nvPicPr>
+        <p:blipFill>
+          <a:blip r:embed="rId9" cstate="print">
+            <a:biLevel thresh="50000"/>
+            <a:extLst>
+              <a:ext uri="{BEBA8EAE-BF5A-486C-A8C5-ECC9F3942E4B}">
+                <a14:imgProps xmlns:a14="http://schemas.microsoft.com/office/drawing/2010/main">
+                  <a14:imgLayer r:embed="rId10">
+                    <a14:imgEffect>
+                      <a14:artisticPhotocopy/>
+                    </a14:imgEffect>
+                  </a14:imgLayer>
+                </a14:imgProps>
+              </a:ext>
+              <a:ext uri="{28A0092B-C50C-407E-A947-70E740481C1C}">
+                <a14:useLocalDpi xmlns:a14="http://schemas.microsoft.com/office/drawing/2010/main" val="0"/>
+              </a:ext>
+            </a:extLst>
+          </a:blip>
+          <a:stretch>
+            <a:fillRect/>
+          </a:stretch>
+        </p:blipFill>
+        <p:spPr>
+          <a:xfrm>
+            <a:off x="6532701" y="2194560"/>
+            <a:ext cx="125274" cy="125274"/>
+          </a:xfrm>
+          <a:prstGeom prst="rect">
+            <a:avLst/>
+          </a:prstGeom>
+        </p:spPr>
+      </p:pic>
+      <p:pic>
+        <p:nvPicPr>
+          <p:cNvPr id="9" name="Picture 8"/>
+          <p:cNvPicPr>
+            <a:picLocks noChangeAspect="1"/>
+          </p:cNvPicPr>
+          <p:nvPr/>
+        </p:nvPicPr>
+        <p:blipFill>
+          <a:blip r:embed="rId11" cstate="print">
+            <a:biLevel thresh="50000"/>
+            <a:extLst>
+              <a:ext uri="{BEBA8EAE-BF5A-486C-A8C5-ECC9F3942E4B}">
+                <a14:imgProps xmlns:a14="http://schemas.microsoft.com/office/drawing/2010/main">
+                  <a14:imgLayer r:embed="rId12">
+                    <a14:imgEffect>
+                      <a14:artisticPhotocopy/>
+                    </a14:imgEffect>
+                  </a14:imgLayer>
+                </a14:imgProps>
+              </a:ext>
+              <a:ext uri="{28A0092B-C50C-407E-A947-70E740481C1C}">
+                <a14:useLocalDpi xmlns:a14="http://schemas.microsoft.com/office/drawing/2010/main" val="0"/>
+              </a:ext>
+            </a:extLst>
+          </a:blip>
+          <a:stretch>
+            <a:fillRect/>
+          </a:stretch>
+        </p:blipFill>
+        <p:spPr>
+          <a:xfrm>
+            <a:off x="7458075" y="2194561"/>
+            <a:ext cx="128696" cy="128696"/>
+          </a:xfrm>
+          <a:prstGeom prst="rect">
+            <a:avLst/>
+          </a:prstGeom>
+        </p:spPr>
+      </p:pic>
+      <p:pic>
+        <p:nvPicPr>
+          <p:cNvPr id="10" name="Picture 9"/>
+          <p:cNvPicPr>
+            <a:picLocks noChangeAspect="1"/>
+          </p:cNvPicPr>
+          <p:nvPr/>
+        </p:nvPicPr>
+        <p:blipFill>
+          <a:blip r:embed="rId13" cstate="print">
+            <a:biLevel thresh="50000"/>
+            <a:extLst>
+              <a:ext uri="{BEBA8EAE-BF5A-486C-A8C5-ECC9F3942E4B}">
+                <a14:imgProps xmlns:a14="http://schemas.microsoft.com/office/drawing/2010/main">
+                  <a14:imgLayer r:embed="rId14">
+                    <a14:imgEffect>
+                      <a14:artisticPhotocopy/>
+                    </a14:imgEffect>
+                  </a14:imgLayer>
+                </a14:imgProps>
+              </a:ext>
+              <a:ext uri="{28A0092B-C50C-407E-A947-70E740481C1C}">
+                <a14:useLocalDpi xmlns:a14="http://schemas.microsoft.com/office/drawing/2010/main" val="0"/>
+              </a:ext>
+            </a:extLst>
+          </a:blip>
+          <a:stretch>
+            <a:fillRect/>
+          </a:stretch>
+        </p:blipFill>
+        <p:spPr>
+          <a:xfrm>
+            <a:off x="8217694" y="2194560"/>
+            <a:ext cx="131864" cy="131864"/>
+          </a:xfrm>
+          <a:prstGeom prst="rect">
+            <a:avLst/>
+          </a:prstGeom>
+        </p:spPr>
+      </p:pic>
+      <p:pic>
+        <p:nvPicPr>
+          <p:cNvPr id="11" name="Picture 10"/>
+          <p:cNvPicPr>
+            <a:picLocks noChangeAspect="1"/>
+          </p:cNvPicPr>
+          <p:nvPr/>
+        </p:nvPicPr>
+        <p:blipFill>
+          <a:blip r:embed="rId15" cstate="print">
+            <a:biLevel thresh="50000"/>
+            <a:extLst>
+              <a:ext uri="{BEBA8EAE-BF5A-486C-A8C5-ECC9F3942E4B}">
+                <a14:imgProps xmlns:a14="http://schemas.microsoft.com/office/drawing/2010/main">
+                  <a14:imgLayer r:embed="rId16">
+                    <a14:imgEffect>
+                      <a14:artisticPhotocopy/>
+                    </a14:imgEffect>
+                  </a14:imgLayer>
+                </a14:imgProps>
+              </a:ext>
+              <a:ext uri="{28A0092B-C50C-407E-A947-70E740481C1C}">
+                <a14:useLocalDpi xmlns:a14="http://schemas.microsoft.com/office/drawing/2010/main" val="0"/>
+              </a:ext>
+            </a:extLst>
+          </a:blip>
+          <a:stretch>
+            <a:fillRect/>
+          </a:stretch>
+        </p:blipFill>
+        <p:spPr>
+          <a:xfrm>
+            <a:off x="8946356" y="2197561"/>
+            <a:ext cx="125696" cy="125696"/>
+          </a:xfrm>
+          <a:prstGeom prst="rect">
+            <a:avLst/>
+          </a:prstGeom>
+        </p:spPr>
+      </p:pic>
+      <p:pic>
+        <p:nvPicPr>
+          <p:cNvPr id="12" name="Picture 11"/>
+          <p:cNvPicPr>
+            <a:picLocks noChangeAspect="1"/>
+          </p:cNvPicPr>
+          <p:nvPr/>
+        </p:nvPicPr>
+        <p:blipFill>
+          <a:blip r:embed="rId17" cstate="print">
+            <a:biLevel thresh="50000"/>
+            <a:extLst>
+              <a:ext uri="{BEBA8EAE-BF5A-486C-A8C5-ECC9F3942E4B}">
+                <a14:imgProps xmlns:a14="http://schemas.microsoft.com/office/drawing/2010/main">
+                  <a14:imgLayer r:embed="rId18">
+                    <a14:imgEffect>
+                      <a14:artisticPhotocopy/>
+                    </a14:imgEffect>
+                  </a14:imgLayer>
+                </a14:imgProps>
+              </a:ext>
+              <a:ext uri="{28A0092B-C50C-407E-A947-70E740481C1C}">
+                <a14:useLocalDpi xmlns:a14="http://schemas.microsoft.com/office/drawing/2010/main" val="0"/>
+              </a:ext>
+            </a:extLst>
+          </a:blip>
+          <a:stretch>
+            <a:fillRect/>
+          </a:stretch>
+        </p:blipFill>
+        <p:spPr>
+          <a:xfrm>
+            <a:off x="6849863" y="2194560"/>
+            <a:ext cx="134343" cy="134343"/>
+          </a:xfrm>
+          <a:prstGeom prst="rect">
+            <a:avLst/>
+          </a:prstGeom>
+        </p:spPr>
+      </p:pic>
+      <p:pic>
+        <p:nvPicPr>
+          <p:cNvPr id="13" name="Picture 12"/>
+          <p:cNvPicPr>
+            <a:picLocks noChangeAspect="1"/>
+          </p:cNvPicPr>
+          <p:nvPr/>
+        </p:nvPicPr>
+        <p:blipFill>
+          <a:blip r:embed="rId19" cstate="print">
+            <a:biLevel thresh="50000"/>
+            <a:extLst>
+              <a:ext uri="{BEBA8EAE-BF5A-486C-A8C5-ECC9F3942E4B}">
+                <a14:imgProps xmlns:a14="http://schemas.microsoft.com/office/drawing/2010/main">
+                  <a14:imgLayer r:embed="rId20">
+                    <a14:imgEffect>
+                      <a14:artisticPhotocopy/>
+                    </a14:imgEffect>
+                  </a14:imgLayer>
+                </a14:imgProps>
+              </a:ext>
+              <a:ext uri="{28A0092B-C50C-407E-A947-70E740481C1C}">
+                <a14:useLocalDpi xmlns:a14="http://schemas.microsoft.com/office/drawing/2010/main" val="0"/>
+              </a:ext>
+            </a:extLst>
+          </a:blip>
+          <a:stretch>
+            <a:fillRect/>
+          </a:stretch>
+        </p:blipFill>
+        <p:spPr>
+          <a:xfrm>
+            <a:off x="7136020" y="2188955"/>
+            <a:ext cx="169656" cy="169656"/>
+          </a:xfrm>
+          <a:prstGeom prst="rect">
+            <a:avLst/>
+          </a:prstGeom>
+        </p:spPr>
+      </p:pic>
+      <p:pic>
+        <p:nvPicPr>
+          <p:cNvPr id="14" name="Picture 13"/>
+          <p:cNvPicPr>
+            <a:picLocks noChangeAspect="1"/>
+          </p:cNvPicPr>
+          <p:nvPr/>
+        </p:nvPicPr>
+        <p:blipFill>
+          <a:blip r:embed="rId21" cstate="print">
+            <a:biLevel thresh="50000"/>
+            <a:extLst>
+              <a:ext uri="{BEBA8EAE-BF5A-486C-A8C5-ECC9F3942E4B}">
+                <a14:imgProps xmlns:a14="http://schemas.microsoft.com/office/drawing/2010/main">
+                  <a14:imgLayer r:embed="rId22">
+                    <a14:imgEffect>
+                      <a14:artisticPhotocopy/>
+                    </a14:imgEffect>
+                  </a14:imgLayer>
+                </a14:imgProps>
+              </a:ext>
+              <a:ext uri="{28A0092B-C50C-407E-A947-70E740481C1C}">
+                <a14:useLocalDpi xmlns:a14="http://schemas.microsoft.com/office/drawing/2010/main" val="0"/>
+              </a:ext>
+            </a:extLst>
+          </a:blip>
+          <a:stretch>
+            <a:fillRect/>
+          </a:stretch>
+        </p:blipFill>
+        <p:spPr>
+          <a:xfrm>
+            <a:off x="7793932" y="2188955"/>
+            <a:ext cx="134302" cy="134302"/>
+          </a:xfrm>
+          <a:prstGeom prst="rect">
+            <a:avLst/>
+          </a:prstGeom>
+        </p:spPr>
+      </p:pic>
+      <p:pic>
+        <p:nvPicPr>
+          <p:cNvPr id="15" name="Picture 14"/>
+          <p:cNvPicPr>
+            <a:picLocks noChangeAspect="1"/>
+          </p:cNvPicPr>
+          <p:nvPr/>
+        </p:nvPicPr>
+        <p:blipFill>
+          <a:blip r:embed="rId23" cstate="print">
+            <a:biLevel thresh="25000"/>
+            <a:extLst>
+              <a:ext uri="{BEBA8EAE-BF5A-486C-A8C5-ECC9F3942E4B}">
+                <a14:imgProps xmlns:a14="http://schemas.microsoft.com/office/drawing/2010/main">
+                  <a14:imgLayer r:embed="rId24">
+                    <a14:imgEffect>
+                      <a14:artisticPhotocopy/>
+                    </a14:imgEffect>
+                  </a14:imgLayer>
+                </a14:imgProps>
+              </a:ext>
+              <a:ext uri="{28A0092B-C50C-407E-A947-70E740481C1C}">
+                <a14:useLocalDpi xmlns:a14="http://schemas.microsoft.com/office/drawing/2010/main" val="0"/>
+              </a:ext>
+            </a:extLst>
+          </a:blip>
+          <a:stretch>
+            <a:fillRect/>
+          </a:stretch>
+        </p:blipFill>
+        <p:spPr>
+          <a:xfrm>
+            <a:off x="8512627" y="2188955"/>
+            <a:ext cx="181317" cy="181317"/>
+          </a:xfrm>
+          <a:prstGeom prst="rect">
+            <a:avLst/>
+          </a:prstGeom>
+        </p:spPr>
+      </p:pic>
+      <p:pic>
+        <p:nvPicPr>
+          <p:cNvPr id="16" name="Picture 15"/>
+          <p:cNvPicPr>
+            <a:picLocks noChangeAspect="1"/>
+          </p:cNvPicPr>
+          <p:nvPr/>
+        </p:nvPicPr>
+        <p:blipFill>
+          <a:blip r:embed="rId25" cstate="print">
+            <a:extLst>
+              <a:ext uri="{28A0092B-C50C-407E-A947-70E740481C1C}">
+                <a14:useLocalDpi xmlns:a14="http://schemas.microsoft.com/office/drawing/2010/main" val="0"/>
+              </a:ext>
+            </a:extLst>
+          </a:blip>
+          <a:stretch>
+            <a:fillRect/>
+          </a:stretch>
+        </p:blipFill>
+        <p:spPr>
+          <a:xfrm>
+            <a:off x="9396484" y="2160090"/>
+            <a:ext cx="252000" cy="252000"/>
+          </a:xfrm>
+          <a:prstGeom prst="rect">
+            <a:avLst/>
+          </a:prstGeom>
+        </p:spPr>
+      </p:pic>
+      <p:pic>
+        <p:nvPicPr>
+          <p:cNvPr id="17" name="Picture 16"/>
+          <p:cNvPicPr>
+            <a:picLocks noChangeAspect="1"/>
+          </p:cNvPicPr>
+          <p:nvPr/>
+        </p:nvPicPr>
+        <p:blipFill>
+          <a:blip r:embed="rId26" cstate="print">
+            <a:biLevel thresh="50000"/>
+            <a:extLst>
+              <a:ext uri="{BEBA8EAE-BF5A-486C-A8C5-ECC9F3942E4B}">
+                <a14:imgProps xmlns:a14="http://schemas.microsoft.com/office/drawing/2010/main">
+                  <a14:imgLayer r:embed="rId4">
+                    <a14:imgEffect>
+                      <a14:artisticPhotocopy/>
+                    </a14:imgEffect>
+                  </a14:imgLayer>
+                </a14:imgProps>
+              </a:ext>
+              <a:ext uri="{28A0092B-C50C-407E-A947-70E740481C1C}">
+                <a14:useLocalDpi xmlns:a14="http://schemas.microsoft.com/office/drawing/2010/main" val="0"/>
+              </a:ext>
+            </a:extLst>
+          </a:blip>
+          <a:stretch>
+            <a:fillRect/>
+          </a:stretch>
+        </p:blipFill>
+        <p:spPr>
+          <a:xfrm>
+            <a:off x="4485324" y="2200474"/>
+            <a:ext cx="116006" cy="116006"/>
+          </a:xfrm>
+          <a:prstGeom prst="rect">
+            <a:avLst/>
+          </a:prstGeom>
+        </p:spPr>
+      </p:pic>
+      <p:pic>
+        <p:nvPicPr>
+          <p:cNvPr id="18" name="Picture 17"/>
+          <p:cNvPicPr>
+            <a:picLocks noChangeAspect="1"/>
+          </p:cNvPicPr>
+          <p:nvPr/>
+        </p:nvPicPr>
+        <p:blipFill>
+          <a:blip r:embed="rId27" cstate="print">
+            <a:biLevel thresh="25000"/>
+            <a:extLst>
+              <a:ext uri="{BEBA8EAE-BF5A-486C-A8C5-ECC9F3942E4B}">
+                <a14:imgProps xmlns:a14="http://schemas.microsoft.com/office/drawing/2010/main">
+                  <a14:imgLayer r:embed="rId28">
+                    <a14:imgEffect>
+                      <a14:artisticPhotocopy/>
+                    </a14:imgEffect>
+                  </a14:imgLayer>
+                </a14:imgProps>
+              </a:ext>
+              <a:ext uri="{28A0092B-C50C-407E-A947-70E740481C1C}">
+                <a14:useLocalDpi xmlns:a14="http://schemas.microsoft.com/office/drawing/2010/main" val="0"/>
+              </a:ext>
+            </a:extLst>
+          </a:blip>
+          <a:stretch>
+            <a:fillRect/>
+          </a:stretch>
+        </p:blipFill>
+        <p:spPr>
+          <a:xfrm>
+            <a:off x="4764399" y="2188956"/>
+            <a:ext cx="166070" cy="142266"/>
+          </a:xfrm>
+          <a:prstGeom prst="rect">
+            <a:avLst/>
+          </a:prstGeom>
+        </p:spPr>
+      </p:pic>
+      <p:pic>
+        <p:nvPicPr>
+          <p:cNvPr id="19" name="Picture 18"/>
+          <p:cNvPicPr>
+            <a:picLocks noChangeAspect="1"/>
+          </p:cNvPicPr>
+          <p:nvPr/>
+        </p:nvPicPr>
+        <p:blipFill>
+          <a:blip r:embed="rId29" cstate="print">
+            <a:biLevel thresh="25000"/>
+            <a:extLst>
+              <a:ext uri="{BEBA8EAE-BF5A-486C-A8C5-ECC9F3942E4B}">
+                <a14:imgProps xmlns:a14="http://schemas.microsoft.com/office/drawing/2010/main">
+                  <a14:imgLayer r:embed="rId30">
+                    <a14:imgEffect>
+                      <a14:artisticPhotocopy/>
+                    </a14:imgEffect>
+                  </a14:imgLayer>
+                </a14:imgProps>
+              </a:ext>
+              <a:ext uri="{28A0092B-C50C-407E-A947-70E740481C1C}">
+                <a14:useLocalDpi xmlns:a14="http://schemas.microsoft.com/office/drawing/2010/main" val="0"/>
+              </a:ext>
+            </a:extLst>
+          </a:blip>
+          <a:stretch>
+            <a:fillRect/>
+          </a:stretch>
+        </p:blipFill>
+        <p:spPr>
+          <a:xfrm>
+            <a:off x="6302231" y="2196577"/>
+            <a:ext cx="129168" cy="134120"/>
+          </a:xfrm>
+          <a:prstGeom prst="rect">
+            <a:avLst/>
+          </a:prstGeom>
+        </p:spPr>
+      </p:pic>
+      <p:pic>
+        <p:nvPicPr>
+          <p:cNvPr id="20" name="Picture 19"/>
+          <p:cNvPicPr>
+            <a:picLocks noChangeAspect="1"/>
+          </p:cNvPicPr>
+          <p:nvPr/>
+        </p:nvPicPr>
+        <p:blipFill>
+          <a:blip r:embed="rId31" cstate="print">
+            <a:lum bright="70000" contrast="-70000"/>
+            <a:extLst>
+              <a:ext uri="{BEBA8EAE-BF5A-486C-A8C5-ECC9F3942E4B}">
+                <a14:imgProps xmlns:a14="http://schemas.microsoft.com/office/drawing/2010/main">
+                  <a14:imgLayer r:embed="rId18">
+                    <a14:imgEffect>
+                      <a14:artisticPhotocopy/>
+                    </a14:imgEffect>
+                  </a14:imgLayer>
+                </a14:imgProps>
+              </a:ext>
+              <a:ext uri="{28A0092B-C50C-407E-A947-70E740481C1C}">
+                <a14:useLocalDpi xmlns:a14="http://schemas.microsoft.com/office/drawing/2010/main" val="0"/>
+              </a:ext>
+            </a:extLst>
+          </a:blip>
+          <a:stretch>
+            <a:fillRect/>
+          </a:stretch>
+        </p:blipFill>
+        <p:spPr>
+          <a:xfrm>
+            <a:off x="8010165" y="2195986"/>
+            <a:ext cx="134711" cy="134711"/>
+          </a:xfrm>
+          <a:prstGeom prst="rect">
+            <a:avLst/>
+          </a:prstGeom>
+        </p:spPr>
+      </p:pic>
+      <p:pic>
+        <p:nvPicPr>
+          <p:cNvPr id="21" name="Picture 20"/>
+          <p:cNvPicPr>
+            <a:picLocks noChangeAspect="1"/>
+          </p:cNvPicPr>
+          <p:nvPr/>
+        </p:nvPicPr>
+        <p:blipFill>
+          <a:blip r:embed="rId32" cstate="print">
+            <a:lum bright="70000" contrast="-70000"/>
+            <a:extLst>
+              <a:ext uri="{BEBA8EAE-BF5A-486C-A8C5-ECC9F3942E4B}">
+                <a14:imgProps xmlns:a14="http://schemas.microsoft.com/office/drawing/2010/main">
+                  <a14:imgLayer r:embed="rId33">
+                    <a14:imgEffect>
+                      <a14:artisticPhotocopy/>
+                    </a14:imgEffect>
+                  </a14:imgLayer>
+                </a14:imgProps>
+              </a:ext>
+              <a:ext uri="{28A0092B-C50C-407E-A947-70E740481C1C}">
+                <a14:useLocalDpi xmlns:a14="http://schemas.microsoft.com/office/drawing/2010/main" val="0"/>
+              </a:ext>
+            </a:extLst>
+          </a:blip>
+          <a:stretch>
+            <a:fillRect/>
+          </a:stretch>
+        </p:blipFill>
+        <p:spPr>
+          <a:xfrm>
+            <a:off x="4209820" y="2188954"/>
+            <a:ext cx="109743" cy="144129"/>
+          </a:xfrm>
+          <a:prstGeom prst="rect">
+            <a:avLst/>
+          </a:prstGeom>
+        </p:spPr>
+      </p:pic>
+      <p:pic>
+        <p:nvPicPr>
+          <p:cNvPr id="22" name="Picture 21"/>
+          <p:cNvPicPr>
+            <a:picLocks noChangeAspect="1"/>
+          </p:cNvPicPr>
+          <p:nvPr/>
+        </p:nvPicPr>
+        <p:blipFill>
+          <a:blip r:embed="rId34" cstate="print">
+            <a:extLst>
+              <a:ext uri="{28A0092B-C50C-407E-A947-70E740481C1C}">
+                <a14:useLocalDpi xmlns:a14="http://schemas.microsoft.com/office/drawing/2010/main" val="0"/>
+              </a:ext>
+            </a:extLst>
+          </a:blip>
+          <a:stretch>
+            <a:fillRect/>
+          </a:stretch>
+        </p:blipFill>
+        <p:spPr>
+          <a:xfrm>
+            <a:off x="3794669" y="2896406"/>
+            <a:ext cx="743994" cy="743994"/>
+          </a:xfrm>
+          <a:prstGeom prst="rect">
+            <a:avLst/>
+          </a:prstGeom>
+        </p:spPr>
+      </p:pic>
+      <p:pic>
+        <p:nvPicPr>
+          <p:cNvPr id="25" name="Picture 24"/>
+          <p:cNvPicPr>
+            <a:picLocks noChangeAspect="1"/>
+          </p:cNvPicPr>
+          <p:nvPr/>
+        </p:nvPicPr>
+        <p:blipFill>
+          <a:blip r:embed="rId35" cstate="print">
+            <a:biLevel thresh="25000"/>
+            <a:extLst>
+              <a:ext uri="{BEBA8EAE-BF5A-486C-A8C5-ECC9F3942E4B}">
+                <a14:imgProps xmlns:a14="http://schemas.microsoft.com/office/drawing/2010/main">
+                  <a14:imgLayer r:embed="rId36">
+                    <a14:imgEffect>
+                      <a14:artisticPhotocopy/>
+                    </a14:imgEffect>
+                  </a14:imgLayer>
+                </a14:imgProps>
+              </a:ext>
+              <a:ext uri="{28A0092B-C50C-407E-A947-70E740481C1C}">
+                <a14:useLocalDpi xmlns:a14="http://schemas.microsoft.com/office/drawing/2010/main" val="0"/>
+              </a:ext>
+            </a:extLst>
+          </a:blip>
+          <a:stretch>
+            <a:fillRect/>
+          </a:stretch>
+        </p:blipFill>
+        <p:spPr>
+          <a:xfrm>
+            <a:off x="4930469" y="2803859"/>
+            <a:ext cx="847487" cy="847487"/>
+          </a:xfrm>
+          <a:prstGeom prst="rect">
+            <a:avLst/>
+          </a:prstGeom>
+        </p:spPr>
+      </p:pic>
+      <p:pic>
+        <p:nvPicPr>
+          <p:cNvPr id="26" name="Picture 25"/>
+          <p:cNvPicPr>
+            <a:picLocks noChangeAspect="1"/>
+          </p:cNvPicPr>
+          <p:nvPr/>
+        </p:nvPicPr>
+        <p:blipFill>
+          <a:blip r:embed="rId37" cstate="print">
+            <a:biLevel thresh="50000"/>
+            <a:extLst>
+              <a:ext uri="{BEBA8EAE-BF5A-486C-A8C5-ECC9F3942E4B}">
+                <a14:imgProps xmlns:a14="http://schemas.microsoft.com/office/drawing/2010/main">
+                  <a14:imgLayer r:embed="rId38">
+                    <a14:imgEffect>
+                      <a14:artisticPhotocopy/>
+                    </a14:imgEffect>
+                  </a14:imgLayer>
+                </a14:imgProps>
+              </a:ext>
+              <a:ext uri="{28A0092B-C50C-407E-A947-70E740481C1C}">
+                <a14:useLocalDpi xmlns:a14="http://schemas.microsoft.com/office/drawing/2010/main" val="0"/>
+              </a:ext>
+            </a:extLst>
+          </a:blip>
+          <a:stretch>
+            <a:fillRect/>
+          </a:stretch>
+        </p:blipFill>
+        <p:spPr>
+          <a:xfrm>
+            <a:off x="3861287" y="2195986"/>
+            <a:ext cx="150796" cy="134711"/>
+          </a:xfrm>
+          <a:prstGeom prst="rect">
+            <a:avLst/>
+          </a:prstGeom>
+        </p:spPr>
+      </p:pic>
+    </p:spTree>
+    <p:extLst>
+      <p:ext uri="{BB962C8B-B14F-4D97-AF65-F5344CB8AC3E}">
+        <p14:creationId xmlns:p14="http://schemas.microsoft.com/office/powerpoint/2010/main" val="649731860"/>
+      </p:ext>
+    </p:extLst>
+  </p:cSld>
+  <p:clrMapOvr>
+    <a:masterClrMapping/>
+  </p:clrMapOvr>
+</p:sld>
+</file>
+
 <file path=ppt/theme/theme1.xml><?xml version="1.0" encoding="utf-8"?>
 <a:theme xmlns:a="http://schemas.openxmlformats.org/drawingml/2006/main" name="Office Theme">
   <a:themeElements>

</xml_diff>

<commit_message>
Hash for rhapsody added. Welcome screen update.
</commit_message>
<xml_diff>
--- a/Logo/logom.pptx
+++ b/Logo/logom.pptx
@@ -7,6 +7,8 @@
   <p:sldIdLst>
     <p:sldId id="256" r:id="rId2"/>
     <p:sldId id="257" r:id="rId3"/>
+    <p:sldId id="258" r:id="rId4"/>
+    <p:sldId id="259" r:id="rId5"/>
   </p:sldIdLst>
   <p:sldSz cx="12192000" cy="6858000"/>
   <p:notesSz cx="6858000" cy="9144000"/>
@@ -2419,7 +2421,9 @@
     <p:bg>
       <p:bgPr>
         <a:solidFill>
-          <a:schemeClr val="tx1"/>
+          <a:schemeClr val="bg1">
+            <a:lumMod val="50000"/>
+          </a:schemeClr>
         </a:solidFill>
         <a:effectLst/>
       </p:bgPr>
@@ -3274,6 +3278,46 @@
           <p:nvPr/>
         </p:nvPicPr>
         <p:blipFill>
+          <a:blip r:embed="rId5" cstate="print">
+            <a:biLevel thresh="50000"/>
+            <a:extLst>
+              <a:ext uri="{BEBA8EAE-BF5A-486C-A8C5-ECC9F3942E4B}">
+                <a14:imgProps xmlns:a14="http://schemas.microsoft.com/office/drawing/2010/main">
+                  <a14:imgLayer r:embed="rId6">
+                    <a14:imgEffect>
+                      <a14:artisticPhotocopy/>
+                    </a14:imgEffect>
+                  </a14:imgLayer>
+                </a14:imgProps>
+              </a:ext>
+              <a:ext uri="{28A0092B-C50C-407E-A947-70E740481C1C}">
+                <a14:useLocalDpi xmlns:a14="http://schemas.microsoft.com/office/drawing/2010/main" val="0"/>
+              </a:ext>
+            </a:extLst>
+          </a:blip>
+          <a:stretch>
+            <a:fillRect/>
+          </a:stretch>
+        </p:blipFill>
+        <p:spPr>
+          <a:xfrm>
+            <a:off x="6532701" y="2194560"/>
+            <a:ext cx="125274" cy="125274"/>
+          </a:xfrm>
+          <a:prstGeom prst="rect">
+            <a:avLst/>
+          </a:prstGeom>
+        </p:spPr>
+      </p:pic>
+      <p:pic>
+        <p:nvPicPr>
+          <p:cNvPr id="9" name="Picture 8"/>
+          <p:cNvPicPr>
+            <a:picLocks noChangeAspect="1"/>
+          </p:cNvPicPr>
+          <p:nvPr/>
+        </p:nvPicPr>
+        <p:blipFill>
           <a:blip r:embed="rId9" cstate="print">
             <a:biLevel thresh="50000"/>
             <a:extLst>
@@ -3297,8 +3341,8 @@
         </p:blipFill>
         <p:spPr>
           <a:xfrm>
-            <a:off x="6532701" y="2194560"/>
-            <a:ext cx="125274" cy="125274"/>
+            <a:off x="7458075" y="2194561"/>
+            <a:ext cx="128696" cy="128696"/>
           </a:xfrm>
           <a:prstGeom prst="rect">
             <a:avLst/>
@@ -3307,7 +3351,7 @@
       </p:pic>
       <p:pic>
         <p:nvPicPr>
-          <p:cNvPr id="9" name="Picture 8"/>
+          <p:cNvPr id="10" name="Picture 9"/>
           <p:cNvPicPr>
             <a:picLocks noChangeAspect="1"/>
           </p:cNvPicPr>
@@ -3337,8 +3381,8 @@
         </p:blipFill>
         <p:spPr>
           <a:xfrm>
-            <a:off x="7458075" y="2194561"/>
-            <a:ext cx="128696" cy="128696"/>
+            <a:off x="8217694" y="2194560"/>
+            <a:ext cx="131864" cy="131864"/>
           </a:xfrm>
           <a:prstGeom prst="rect">
             <a:avLst/>
@@ -3347,19 +3391,19 @@
       </p:pic>
       <p:pic>
         <p:nvPicPr>
-          <p:cNvPr id="10" name="Picture 9"/>
+          <p:cNvPr id="11" name="Picture 10"/>
           <p:cNvPicPr>
             <a:picLocks noChangeAspect="1"/>
           </p:cNvPicPr>
           <p:nvPr/>
         </p:nvPicPr>
         <p:blipFill>
-          <a:blip r:embed="rId13" cstate="print">
+          <a:blip r:embed="rId5" cstate="print">
             <a:biLevel thresh="50000"/>
             <a:extLst>
               <a:ext uri="{BEBA8EAE-BF5A-486C-A8C5-ECC9F3942E4B}">
                 <a14:imgProps xmlns:a14="http://schemas.microsoft.com/office/drawing/2010/main">
-                  <a14:imgLayer r:embed="rId14">
+                  <a14:imgLayer r:embed="rId6">
                     <a14:imgEffect>
                       <a14:artisticPhotocopy/>
                     </a14:imgEffect>
@@ -3377,8 +3421,8 @@
         </p:blipFill>
         <p:spPr>
           <a:xfrm>
-            <a:off x="8217694" y="2194560"/>
-            <a:ext cx="131864" cy="131864"/>
+            <a:off x="8946356" y="2197561"/>
+            <a:ext cx="125696" cy="125696"/>
           </a:xfrm>
           <a:prstGeom prst="rect">
             <a:avLst/>
@@ -3387,19 +3431,19 @@
       </p:pic>
       <p:pic>
         <p:nvPicPr>
-          <p:cNvPr id="11" name="Picture 10"/>
+          <p:cNvPr id="12" name="Picture 11"/>
           <p:cNvPicPr>
             <a:picLocks noChangeAspect="1"/>
           </p:cNvPicPr>
           <p:nvPr/>
         </p:nvPicPr>
         <p:blipFill>
-          <a:blip r:embed="rId15" cstate="print">
+          <a:blip r:embed="rId11" cstate="print">
             <a:biLevel thresh="50000"/>
             <a:extLst>
               <a:ext uri="{BEBA8EAE-BF5A-486C-A8C5-ECC9F3942E4B}">
                 <a14:imgProps xmlns:a14="http://schemas.microsoft.com/office/drawing/2010/main">
-                  <a14:imgLayer r:embed="rId16">
+                  <a14:imgLayer r:embed="rId13">
                     <a14:imgEffect>
                       <a14:artisticPhotocopy/>
                     </a14:imgEffect>
@@ -3417,8 +3461,8 @@
         </p:blipFill>
         <p:spPr>
           <a:xfrm>
-            <a:off x="8946356" y="2197561"/>
-            <a:ext cx="125696" cy="125696"/>
+            <a:off x="6849863" y="2194560"/>
+            <a:ext cx="134343" cy="134343"/>
           </a:xfrm>
           <a:prstGeom prst="rect">
             <a:avLst/>
@@ -3427,19 +3471,19 @@
       </p:pic>
       <p:pic>
         <p:nvPicPr>
-          <p:cNvPr id="12" name="Picture 11"/>
+          <p:cNvPr id="13" name="Picture 12"/>
           <p:cNvPicPr>
             <a:picLocks noChangeAspect="1"/>
           </p:cNvPicPr>
           <p:nvPr/>
         </p:nvPicPr>
         <p:blipFill>
-          <a:blip r:embed="rId17" cstate="print">
+          <a:blip r:embed="rId14" cstate="print">
             <a:biLevel thresh="50000"/>
             <a:extLst>
               <a:ext uri="{BEBA8EAE-BF5A-486C-A8C5-ECC9F3942E4B}">
                 <a14:imgProps xmlns:a14="http://schemas.microsoft.com/office/drawing/2010/main">
-                  <a14:imgLayer r:embed="rId18">
+                  <a14:imgLayer r:embed="rId15">
                     <a14:imgEffect>
                       <a14:artisticPhotocopy/>
                     </a14:imgEffect>
@@ -3457,8 +3501,8 @@
         </p:blipFill>
         <p:spPr>
           <a:xfrm>
-            <a:off x="6849863" y="2194560"/>
-            <a:ext cx="134343" cy="134343"/>
+            <a:off x="7136020" y="2188955"/>
+            <a:ext cx="169656" cy="169656"/>
           </a:xfrm>
           <a:prstGeom prst="rect">
             <a:avLst/>
@@ -3467,19 +3511,19 @@
       </p:pic>
       <p:pic>
         <p:nvPicPr>
-          <p:cNvPr id="13" name="Picture 12"/>
+          <p:cNvPr id="14" name="Picture 13"/>
           <p:cNvPicPr>
             <a:picLocks noChangeAspect="1"/>
           </p:cNvPicPr>
           <p:nvPr/>
         </p:nvPicPr>
         <p:blipFill>
-          <a:blip r:embed="rId19" cstate="print">
+          <a:blip r:embed="rId16" cstate="print">
             <a:biLevel thresh="50000"/>
             <a:extLst>
               <a:ext uri="{BEBA8EAE-BF5A-486C-A8C5-ECC9F3942E4B}">
                 <a14:imgProps xmlns:a14="http://schemas.microsoft.com/office/drawing/2010/main">
-                  <a14:imgLayer r:embed="rId20">
+                  <a14:imgLayer r:embed="rId17">
                     <a14:imgEffect>
                       <a14:artisticPhotocopy/>
                     </a14:imgEffect>
@@ -3497,8 +3541,8 @@
         </p:blipFill>
         <p:spPr>
           <a:xfrm>
-            <a:off x="7136020" y="2188955"/>
-            <a:ext cx="169656" cy="169656"/>
+            <a:off x="7793932" y="2188955"/>
+            <a:ext cx="134302" cy="134302"/>
           </a:xfrm>
           <a:prstGeom prst="rect">
             <a:avLst/>
@@ -3507,7 +3551,117 @@
       </p:pic>
       <p:pic>
         <p:nvPicPr>
-          <p:cNvPr id="14" name="Picture 13"/>
+          <p:cNvPr id="15" name="Picture 14"/>
+          <p:cNvPicPr>
+            <a:picLocks noChangeAspect="1"/>
+          </p:cNvPicPr>
+          <p:nvPr/>
+        </p:nvPicPr>
+        <p:blipFill>
+          <a:blip r:embed="rId18" cstate="print">
+            <a:biLevel thresh="25000"/>
+            <a:extLst>
+              <a:ext uri="{BEBA8EAE-BF5A-486C-A8C5-ECC9F3942E4B}">
+                <a14:imgProps xmlns:a14="http://schemas.microsoft.com/office/drawing/2010/main">
+                  <a14:imgLayer r:embed="rId19">
+                    <a14:imgEffect>
+                      <a14:artisticPhotocopy/>
+                    </a14:imgEffect>
+                  </a14:imgLayer>
+                </a14:imgProps>
+              </a:ext>
+              <a:ext uri="{28A0092B-C50C-407E-A947-70E740481C1C}">
+                <a14:useLocalDpi xmlns:a14="http://schemas.microsoft.com/office/drawing/2010/main" val="0"/>
+              </a:ext>
+            </a:extLst>
+          </a:blip>
+          <a:stretch>
+            <a:fillRect/>
+          </a:stretch>
+        </p:blipFill>
+        <p:spPr>
+          <a:xfrm>
+            <a:off x="8512627" y="2188955"/>
+            <a:ext cx="181317" cy="181317"/>
+          </a:xfrm>
+          <a:prstGeom prst="rect">
+            <a:avLst/>
+          </a:prstGeom>
+        </p:spPr>
+      </p:pic>
+      <p:pic>
+        <p:nvPicPr>
+          <p:cNvPr id="16" name="Picture 15"/>
+          <p:cNvPicPr>
+            <a:picLocks noChangeAspect="1"/>
+          </p:cNvPicPr>
+          <p:nvPr/>
+        </p:nvPicPr>
+        <p:blipFill>
+          <a:blip r:embed="rId20" cstate="print">
+            <a:extLst>
+              <a:ext uri="{28A0092B-C50C-407E-A947-70E740481C1C}">
+                <a14:useLocalDpi xmlns:a14="http://schemas.microsoft.com/office/drawing/2010/main" val="0"/>
+              </a:ext>
+            </a:extLst>
+          </a:blip>
+          <a:stretch>
+            <a:fillRect/>
+          </a:stretch>
+        </p:blipFill>
+        <p:spPr>
+          <a:xfrm>
+            <a:off x="9396484" y="2160090"/>
+            <a:ext cx="252000" cy="252000"/>
+          </a:xfrm>
+          <a:prstGeom prst="rect">
+            <a:avLst/>
+          </a:prstGeom>
+        </p:spPr>
+      </p:pic>
+      <p:pic>
+        <p:nvPicPr>
+          <p:cNvPr id="17" name="Picture 16"/>
+          <p:cNvPicPr>
+            <a:picLocks noChangeAspect="1"/>
+          </p:cNvPicPr>
+          <p:nvPr/>
+        </p:nvPicPr>
+        <p:blipFill>
+          <a:blip r:embed="rId3" cstate="print">
+            <a:biLevel thresh="50000"/>
+            <a:extLst>
+              <a:ext uri="{BEBA8EAE-BF5A-486C-A8C5-ECC9F3942E4B}">
+                <a14:imgProps xmlns:a14="http://schemas.microsoft.com/office/drawing/2010/main">
+                  <a14:imgLayer r:embed="rId4">
+                    <a14:imgEffect>
+                      <a14:artisticPhotocopy/>
+                    </a14:imgEffect>
+                  </a14:imgLayer>
+                </a14:imgProps>
+              </a:ext>
+              <a:ext uri="{28A0092B-C50C-407E-A947-70E740481C1C}">
+                <a14:useLocalDpi xmlns:a14="http://schemas.microsoft.com/office/drawing/2010/main" val="0"/>
+              </a:ext>
+            </a:extLst>
+          </a:blip>
+          <a:stretch>
+            <a:fillRect/>
+          </a:stretch>
+        </p:blipFill>
+        <p:spPr>
+          <a:xfrm>
+            <a:off x="4485324" y="2200474"/>
+            <a:ext cx="116006" cy="116006"/>
+          </a:xfrm>
+          <a:prstGeom prst="rect">
+            <a:avLst/>
+          </a:prstGeom>
+        </p:spPr>
+      </p:pic>
+      <p:pic>
+        <p:nvPicPr>
+          <p:cNvPr id="18" name="Picture 17"/>
           <p:cNvPicPr>
             <a:picLocks noChangeAspect="1"/>
           </p:cNvPicPr>
@@ -3515,7 +3669,7 @@
         </p:nvPicPr>
         <p:blipFill>
           <a:blip r:embed="rId21" cstate="print">
-            <a:biLevel thresh="50000"/>
+            <a:biLevel thresh="25000"/>
             <a:extLst>
               <a:ext uri="{BEBA8EAE-BF5A-486C-A8C5-ECC9F3942E4B}">
                 <a14:imgProps xmlns:a14="http://schemas.microsoft.com/office/drawing/2010/main">
@@ -3537,8 +3691,8 @@
         </p:blipFill>
         <p:spPr>
           <a:xfrm>
-            <a:off x="7793932" y="2188955"/>
-            <a:ext cx="134302" cy="134302"/>
+            <a:off x="4764399" y="2188956"/>
+            <a:ext cx="166070" cy="142266"/>
           </a:xfrm>
           <a:prstGeom prst="rect">
             <a:avLst/>
@@ -3547,7 +3701,7 @@
       </p:pic>
       <p:pic>
         <p:nvPicPr>
-          <p:cNvPr id="15" name="Picture 14"/>
+          <p:cNvPr id="19" name="Picture 18"/>
           <p:cNvPicPr>
             <a:picLocks noChangeAspect="1"/>
           </p:cNvPicPr>
@@ -3577,8 +3731,8 @@
         </p:blipFill>
         <p:spPr>
           <a:xfrm>
-            <a:off x="8512627" y="2188955"/>
-            <a:ext cx="181317" cy="181317"/>
+            <a:off x="6302231" y="2196577"/>
+            <a:ext cx="129168" cy="134120"/>
           </a:xfrm>
           <a:prstGeom prst="rect">
             <a:avLst/>
@@ -3587,7 +3741,7 @@
       </p:pic>
       <p:pic>
         <p:nvPicPr>
-          <p:cNvPr id="16" name="Picture 15"/>
+          <p:cNvPr id="20" name="Picture 19"/>
           <p:cNvPicPr>
             <a:picLocks noChangeAspect="1"/>
           </p:cNvPicPr>
@@ -3595,41 +3749,11 @@
         </p:nvPicPr>
         <p:blipFill>
           <a:blip r:embed="rId25" cstate="print">
-            <a:extLst>
-              <a:ext uri="{28A0092B-C50C-407E-A947-70E740481C1C}">
-                <a14:useLocalDpi xmlns:a14="http://schemas.microsoft.com/office/drawing/2010/main" val="0"/>
-              </a:ext>
-            </a:extLst>
-          </a:blip>
-          <a:stretch>
-            <a:fillRect/>
-          </a:stretch>
-        </p:blipFill>
-        <p:spPr>
-          <a:xfrm>
-            <a:off x="9396484" y="2160090"/>
-            <a:ext cx="252000" cy="252000"/>
-          </a:xfrm>
-          <a:prstGeom prst="rect">
-            <a:avLst/>
-          </a:prstGeom>
-        </p:spPr>
-      </p:pic>
-      <p:pic>
-        <p:nvPicPr>
-          <p:cNvPr id="17" name="Picture 16"/>
-          <p:cNvPicPr>
-            <a:picLocks noChangeAspect="1"/>
-          </p:cNvPicPr>
-          <p:nvPr/>
-        </p:nvPicPr>
-        <p:blipFill>
-          <a:blip r:embed="rId26" cstate="print">
-            <a:biLevel thresh="50000"/>
+            <a:lum bright="70000" contrast="-70000"/>
             <a:extLst>
               <a:ext uri="{BEBA8EAE-BF5A-486C-A8C5-ECC9F3942E4B}">
                 <a14:imgProps xmlns:a14="http://schemas.microsoft.com/office/drawing/2010/main">
-                  <a14:imgLayer r:embed="rId4">
+                  <a14:imgLayer r:embed="rId13">
                     <a14:imgEffect>
                       <a14:artisticPhotocopy/>
                     </a14:imgEffect>
@@ -3647,8 +3771,8 @@
         </p:blipFill>
         <p:spPr>
           <a:xfrm>
-            <a:off x="4485324" y="2200474"/>
-            <a:ext cx="116006" cy="116006"/>
+            <a:off x="8010165" y="2195986"/>
+            <a:ext cx="134711" cy="134711"/>
           </a:xfrm>
           <a:prstGeom prst="rect">
             <a:avLst/>
@@ -3657,19 +3781,19 @@
       </p:pic>
       <p:pic>
         <p:nvPicPr>
-          <p:cNvPr id="18" name="Picture 17"/>
+          <p:cNvPr id="21" name="Picture 20"/>
           <p:cNvPicPr>
             <a:picLocks noChangeAspect="1"/>
           </p:cNvPicPr>
           <p:nvPr/>
         </p:nvPicPr>
         <p:blipFill>
-          <a:blip r:embed="rId27" cstate="print">
-            <a:biLevel thresh="25000"/>
+          <a:blip r:embed="rId26" cstate="print">
+            <a:lum bright="70000" contrast="-70000"/>
             <a:extLst>
               <a:ext uri="{BEBA8EAE-BF5A-486C-A8C5-ECC9F3942E4B}">
                 <a14:imgProps xmlns:a14="http://schemas.microsoft.com/office/drawing/2010/main">
-                  <a14:imgLayer r:embed="rId28">
+                  <a14:imgLayer r:embed="rId27">
                     <a14:imgEffect>
                       <a14:artisticPhotocopy/>
                     </a14:imgEffect>
@@ -3687,8 +3811,8 @@
         </p:blipFill>
         <p:spPr>
           <a:xfrm>
-            <a:off x="4764399" y="2188956"/>
-            <a:ext cx="166070" cy="142266"/>
+            <a:off x="4209820" y="2188954"/>
+            <a:ext cx="109743" cy="144129"/>
           </a:xfrm>
           <a:prstGeom prst="rect">
             <a:avLst/>
@@ -3697,7 +3821,37 @@
       </p:pic>
       <p:pic>
         <p:nvPicPr>
-          <p:cNvPr id="19" name="Picture 18"/>
+          <p:cNvPr id="22" name="Picture 21"/>
+          <p:cNvPicPr>
+            <a:picLocks noChangeAspect="1"/>
+          </p:cNvPicPr>
+          <p:nvPr/>
+        </p:nvPicPr>
+        <p:blipFill>
+          <a:blip r:embed="rId28" cstate="print">
+            <a:extLst>
+              <a:ext uri="{28A0092B-C50C-407E-A947-70E740481C1C}">
+                <a14:useLocalDpi xmlns:a14="http://schemas.microsoft.com/office/drawing/2010/main" val="0"/>
+              </a:ext>
+            </a:extLst>
+          </a:blip>
+          <a:stretch>
+            <a:fillRect/>
+          </a:stretch>
+        </p:blipFill>
+        <p:spPr>
+          <a:xfrm>
+            <a:off x="3794669" y="2896406"/>
+            <a:ext cx="743994" cy="743994"/>
+          </a:xfrm>
+          <a:prstGeom prst="rect">
+            <a:avLst/>
+          </a:prstGeom>
+        </p:spPr>
+      </p:pic>
+      <p:pic>
+        <p:nvPicPr>
+          <p:cNvPr id="25" name="Picture 24"/>
           <p:cNvPicPr>
             <a:picLocks noChangeAspect="1"/>
           </p:cNvPicPr>
@@ -3727,8 +3881,8 @@
         </p:blipFill>
         <p:spPr>
           <a:xfrm>
-            <a:off x="6302231" y="2196577"/>
-            <a:ext cx="129168" cy="134120"/>
+            <a:off x="4930469" y="2803859"/>
+            <a:ext cx="847487" cy="847487"/>
           </a:xfrm>
           <a:prstGeom prst="rect">
             <a:avLst/>
@@ -3737,7 +3891,7 @@
       </p:pic>
       <p:pic>
         <p:nvPicPr>
-          <p:cNvPr id="20" name="Picture 19"/>
+          <p:cNvPr id="26" name="Picture 25"/>
           <p:cNvPicPr>
             <a:picLocks noChangeAspect="1"/>
           </p:cNvPicPr>
@@ -3745,11 +3899,11 @@
         </p:nvPicPr>
         <p:blipFill>
           <a:blip r:embed="rId31" cstate="print">
-            <a:lum bright="70000" contrast="-70000"/>
+            <a:biLevel thresh="50000"/>
             <a:extLst>
               <a:ext uri="{BEBA8EAE-BF5A-486C-A8C5-ECC9F3942E4B}">
                 <a14:imgProps xmlns:a14="http://schemas.microsoft.com/office/drawing/2010/main">
-                  <a14:imgLayer r:embed="rId18">
+                  <a14:imgLayer r:embed="rId32">
                     <a14:imgEffect>
                       <a14:artisticPhotocopy/>
                     </a14:imgEffect>
@@ -3767,64 +3921,856 @@
         </p:blipFill>
         <p:spPr>
           <a:xfrm>
-            <a:off x="8010165" y="2195986"/>
-            <a:ext cx="134711" cy="134711"/>
+            <a:off x="3861287" y="2195986"/>
+            <a:ext cx="150796" cy="134711"/>
           </a:xfrm>
           <a:prstGeom prst="rect">
             <a:avLst/>
           </a:prstGeom>
         </p:spPr>
       </p:pic>
+    </p:spTree>
+    <p:extLst>
+      <p:ext uri="{BB962C8B-B14F-4D97-AF65-F5344CB8AC3E}">
+        <p14:creationId xmlns:p14="http://schemas.microsoft.com/office/powerpoint/2010/main" val="649731860"/>
+      </p:ext>
+    </p:extLst>
+  </p:cSld>
+  <p:clrMapOvr>
+    <a:masterClrMapping/>
+  </p:clrMapOvr>
+</p:sld>
+</file>
+
+<file path=ppt/slides/slide3.xml><?xml version="1.0" encoding="utf-8"?>
+<p:sld xmlns:a="http://schemas.openxmlformats.org/drawingml/2006/main" xmlns:r="http://schemas.openxmlformats.org/officeDocument/2006/relationships" xmlns:p="http://schemas.openxmlformats.org/presentationml/2006/main">
+  <p:cSld>
+    <p:spTree>
+      <p:nvGrpSpPr>
+        <p:cNvPr id="1" name=""/>
+        <p:cNvGrpSpPr/>
+        <p:nvPr/>
+      </p:nvGrpSpPr>
+      <p:grpSpPr>
+        <a:xfrm>
+          <a:off x="0" y="0"/>
+          <a:ext cx="0" cy="0"/>
+          <a:chOff x="0" y="0"/>
+          <a:chExt cx="0" cy="0"/>
+        </a:xfrm>
+      </p:grpSpPr>
+      <p:sp>
+        <p:nvSpPr>
+          <p:cNvPr id="3" name="Rectangle 2"/>
+          <p:cNvSpPr/>
+          <p:nvPr/>
+        </p:nvSpPr>
+        <p:spPr>
+          <a:xfrm>
+            <a:off x="3000375" y="2445035"/>
+            <a:ext cx="2034000" cy="1797270"/>
+          </a:xfrm>
+          <a:prstGeom prst="rect">
+            <a:avLst/>
+          </a:prstGeom>
+          <a:solidFill>
+            <a:schemeClr val="accent1">
+              <a:lumMod val="75000"/>
+            </a:schemeClr>
+          </a:solidFill>
+          <a:ln w="38100">
+            <a:solidFill>
+              <a:schemeClr val="accent1">
+                <a:lumMod val="50000"/>
+              </a:schemeClr>
+            </a:solidFill>
+          </a:ln>
+        </p:spPr>
+        <p:style>
+          <a:lnRef idx="2">
+            <a:schemeClr val="accent1">
+              <a:shade val="50000"/>
+            </a:schemeClr>
+          </a:lnRef>
+          <a:fillRef idx="1">
+            <a:schemeClr val="accent1"/>
+          </a:fillRef>
+          <a:effectRef idx="0">
+            <a:schemeClr val="accent1"/>
+          </a:effectRef>
+          <a:fontRef idx="minor">
+            <a:schemeClr val="lt1"/>
+          </a:fontRef>
+        </p:style>
+        <p:txBody>
+          <a:bodyPr rtlCol="0" anchor="ctr"/>
+          <a:lstStyle/>
+          <a:p>
+            <a:pPr algn="ctr"/>
+            <a:endParaRPr lang="en-IN" sz="1200" dirty="0" smtClean="0">
+              <a:latin typeface="Adobe Gothic Std B" panose="020B0800000000000000" pitchFamily="34" charset="-128"/>
+              <a:ea typeface="Adobe Gothic Std B" panose="020B0800000000000000" pitchFamily="34" charset="-128"/>
+            </a:endParaRPr>
+          </a:p>
+          <a:p>
+            <a:pPr algn="ctr"/>
+            <a:endParaRPr lang="en-IN" sz="1200" dirty="0" smtClean="0">
+              <a:latin typeface="Adobe Gothic Std B" panose="020B0800000000000000" pitchFamily="34" charset="-128"/>
+              <a:ea typeface="Adobe Gothic Std B" panose="020B0800000000000000" pitchFamily="34" charset="-128"/>
+            </a:endParaRPr>
+          </a:p>
+          <a:p>
+            <a:pPr algn="ctr"/>
+            <a:endParaRPr lang="en-IN" sz="1200" dirty="0">
+              <a:latin typeface="Adobe Gothic Std B" panose="020B0800000000000000" pitchFamily="34" charset="-128"/>
+              <a:ea typeface="Adobe Gothic Std B" panose="020B0800000000000000" pitchFamily="34" charset="-128"/>
+            </a:endParaRPr>
+          </a:p>
+          <a:p>
+            <a:pPr algn="ctr"/>
+            <a:endParaRPr lang="en-IN" sz="1200" dirty="0" smtClean="0">
+              <a:latin typeface="Adobe Gothic Std B" panose="020B0800000000000000" pitchFamily="34" charset="-128"/>
+              <a:ea typeface="Adobe Gothic Std B" panose="020B0800000000000000" pitchFamily="34" charset="-128"/>
+            </a:endParaRPr>
+          </a:p>
+          <a:p>
+            <a:pPr algn="ctr"/>
+            <a:endParaRPr lang="en-IN" sz="1200" dirty="0" smtClean="0">
+              <a:latin typeface="Adobe Gothic Std B" panose="020B0800000000000000" pitchFamily="34" charset="-128"/>
+              <a:ea typeface="Adobe Gothic Std B" panose="020B0800000000000000" pitchFamily="34" charset="-128"/>
+            </a:endParaRPr>
+          </a:p>
+          <a:p>
+            <a:pPr algn="ctr"/>
+            <a:endParaRPr lang="en-IN" sz="1200" dirty="0">
+              <a:latin typeface="Adobe Gothic Std B" panose="020B0800000000000000" pitchFamily="34" charset="-128"/>
+              <a:ea typeface="Adobe Gothic Std B" panose="020B0800000000000000" pitchFamily="34" charset="-128"/>
+            </a:endParaRPr>
+          </a:p>
+          <a:p>
+            <a:pPr algn="ctr"/>
+            <a:r>
+              <a:rPr lang="en-IN" sz="1200" dirty="0" smtClean="0">
+                <a:latin typeface="Adobe Gothic Std B" panose="020B0800000000000000" pitchFamily="34" charset="-128"/>
+                <a:ea typeface="Adobe Gothic Std B" panose="020B0800000000000000" pitchFamily="34" charset="-128"/>
+              </a:rPr>
+              <a:t>Start by adding a password</a:t>
+            </a:r>
+            <a:endParaRPr lang="en-IN" sz="1200" dirty="0">
+              <a:latin typeface="Adobe Gothic Std B" panose="020B0800000000000000" pitchFamily="34" charset="-128"/>
+              <a:ea typeface="Adobe Gothic Std B" panose="020B0800000000000000" pitchFamily="34" charset="-128"/>
+            </a:endParaRPr>
+          </a:p>
+        </p:txBody>
+      </p:sp>
+      <p:sp>
+        <p:nvSpPr>
+          <p:cNvPr id="4" name="Rectangle 3"/>
+          <p:cNvSpPr/>
+          <p:nvPr/>
+        </p:nvSpPr>
+        <p:spPr>
+          <a:xfrm>
+            <a:off x="7192567" y="2445035"/>
+            <a:ext cx="2034000" cy="1797270"/>
+          </a:xfrm>
+          <a:prstGeom prst="rect">
+            <a:avLst/>
+          </a:prstGeom>
+          <a:solidFill>
+            <a:schemeClr val="accent1">
+              <a:lumMod val="75000"/>
+            </a:schemeClr>
+          </a:solidFill>
+          <a:ln w="38100">
+            <a:solidFill>
+              <a:schemeClr val="accent1">
+                <a:lumMod val="50000"/>
+              </a:schemeClr>
+            </a:solidFill>
+          </a:ln>
+        </p:spPr>
+        <p:style>
+          <a:lnRef idx="2">
+            <a:schemeClr val="accent1">
+              <a:shade val="50000"/>
+            </a:schemeClr>
+          </a:lnRef>
+          <a:fillRef idx="1">
+            <a:schemeClr val="accent1"/>
+          </a:fillRef>
+          <a:effectRef idx="0">
+            <a:schemeClr val="accent1"/>
+          </a:effectRef>
+          <a:fontRef idx="minor">
+            <a:schemeClr val="lt1"/>
+          </a:fontRef>
+        </p:style>
+        <p:txBody>
+          <a:bodyPr rtlCol="0" anchor="ctr"/>
+          <a:lstStyle/>
+          <a:p>
+            <a:pPr algn="ctr"/>
+            <a:endParaRPr lang="en-IN" sz="1200" dirty="0">
+              <a:latin typeface="Adobe Gothic Std B" panose="020B0800000000000000" pitchFamily="34" charset="-128"/>
+              <a:ea typeface="Adobe Gothic Std B" panose="020B0800000000000000" pitchFamily="34" charset="-128"/>
+            </a:endParaRPr>
+          </a:p>
+          <a:p>
+            <a:pPr algn="ctr"/>
+            <a:endParaRPr lang="en-IN" sz="1200" dirty="0">
+              <a:latin typeface="Adobe Gothic Std B" panose="020B0800000000000000" pitchFamily="34" charset="-128"/>
+              <a:ea typeface="Adobe Gothic Std B" panose="020B0800000000000000" pitchFamily="34" charset="-128"/>
+            </a:endParaRPr>
+          </a:p>
+          <a:p>
+            <a:pPr algn="ctr"/>
+            <a:endParaRPr lang="en-IN" sz="1200" dirty="0">
+              <a:latin typeface="Adobe Gothic Std B" panose="020B0800000000000000" pitchFamily="34" charset="-128"/>
+              <a:ea typeface="Adobe Gothic Std B" panose="020B0800000000000000" pitchFamily="34" charset="-128"/>
+            </a:endParaRPr>
+          </a:p>
+          <a:p>
+            <a:pPr algn="ctr"/>
+            <a:endParaRPr lang="en-IN" sz="1200" dirty="0">
+              <a:latin typeface="Adobe Gothic Std B" panose="020B0800000000000000" pitchFamily="34" charset="-128"/>
+              <a:ea typeface="Adobe Gothic Std B" panose="020B0800000000000000" pitchFamily="34" charset="-128"/>
+            </a:endParaRPr>
+          </a:p>
+          <a:p>
+            <a:pPr algn="ctr"/>
+            <a:endParaRPr lang="en-IN" sz="1200" dirty="0">
+              <a:latin typeface="Adobe Gothic Std B" panose="020B0800000000000000" pitchFamily="34" charset="-128"/>
+              <a:ea typeface="Adobe Gothic Std B" panose="020B0800000000000000" pitchFamily="34" charset="-128"/>
+            </a:endParaRPr>
+          </a:p>
+          <a:p>
+            <a:pPr algn="ctr"/>
+            <a:endParaRPr lang="en-IN" sz="1200" dirty="0">
+              <a:latin typeface="Adobe Gothic Std B" panose="020B0800000000000000" pitchFamily="34" charset="-128"/>
+              <a:ea typeface="Adobe Gothic Std B" panose="020B0800000000000000" pitchFamily="34" charset="-128"/>
+            </a:endParaRPr>
+          </a:p>
+          <a:p>
+            <a:pPr algn="ctr"/>
+            <a:r>
+              <a:rPr lang="en-IN" sz="1200" dirty="0" smtClean="0">
+                <a:latin typeface="Adobe Gothic Std B" panose="020B0800000000000000" pitchFamily="34" charset="-128"/>
+                <a:ea typeface="Adobe Gothic Std B" panose="020B0800000000000000" pitchFamily="34" charset="-128"/>
+              </a:rPr>
+              <a:t>Select single/multiple rows and copy</a:t>
+            </a:r>
+            <a:endParaRPr lang="en-IN" sz="1200" dirty="0">
+              <a:latin typeface="Adobe Gothic Std B" panose="020B0800000000000000" pitchFamily="34" charset="-128"/>
+              <a:ea typeface="Adobe Gothic Std B" panose="020B0800000000000000" pitchFamily="34" charset="-128"/>
+            </a:endParaRPr>
+          </a:p>
+        </p:txBody>
+      </p:sp>
+      <p:sp>
+        <p:nvSpPr>
+          <p:cNvPr id="5" name="Rectangle 4"/>
+          <p:cNvSpPr/>
+          <p:nvPr/>
+        </p:nvSpPr>
+        <p:spPr>
+          <a:xfrm>
+            <a:off x="5090717" y="2445035"/>
+            <a:ext cx="2034000" cy="1797270"/>
+          </a:xfrm>
+          <a:prstGeom prst="rect">
+            <a:avLst/>
+          </a:prstGeom>
+          <a:solidFill>
+            <a:schemeClr val="accent1">
+              <a:lumMod val="75000"/>
+            </a:schemeClr>
+          </a:solidFill>
+          <a:ln w="38100">
+            <a:solidFill>
+              <a:schemeClr val="accent1">
+                <a:lumMod val="50000"/>
+              </a:schemeClr>
+            </a:solidFill>
+          </a:ln>
+        </p:spPr>
+        <p:style>
+          <a:lnRef idx="2">
+            <a:schemeClr val="accent1">
+              <a:shade val="50000"/>
+            </a:schemeClr>
+          </a:lnRef>
+          <a:fillRef idx="1">
+            <a:schemeClr val="accent1"/>
+          </a:fillRef>
+          <a:effectRef idx="0">
+            <a:schemeClr val="accent1"/>
+          </a:effectRef>
+          <a:fontRef idx="minor">
+            <a:schemeClr val="lt1"/>
+          </a:fontRef>
+        </p:style>
+        <p:txBody>
+          <a:bodyPr rtlCol="0" anchor="ctr"/>
+          <a:lstStyle/>
+          <a:p>
+            <a:pPr algn="ctr"/>
+            <a:endParaRPr lang="en-IN" sz="1300" dirty="0" smtClean="0">
+              <a:latin typeface="Adobe Gothic Std B" panose="020B0800000000000000" pitchFamily="34" charset="-128"/>
+              <a:ea typeface="Adobe Gothic Std B" panose="020B0800000000000000" pitchFamily="34" charset="-128"/>
+            </a:endParaRPr>
+          </a:p>
+          <a:p>
+            <a:pPr algn="ctr"/>
+            <a:endParaRPr lang="en-IN" sz="1300" dirty="0" smtClean="0">
+              <a:latin typeface="Adobe Gothic Std B" panose="020B0800000000000000" pitchFamily="34" charset="-128"/>
+              <a:ea typeface="Adobe Gothic Std B" panose="020B0800000000000000" pitchFamily="34" charset="-128"/>
+            </a:endParaRPr>
+          </a:p>
+          <a:p>
+            <a:pPr algn="ctr"/>
+            <a:endParaRPr lang="en-IN" sz="1300" dirty="0">
+              <a:latin typeface="Adobe Gothic Std B" panose="020B0800000000000000" pitchFamily="34" charset="-128"/>
+              <a:ea typeface="Adobe Gothic Std B" panose="020B0800000000000000" pitchFamily="34" charset="-128"/>
+            </a:endParaRPr>
+          </a:p>
+          <a:p>
+            <a:pPr algn="ctr"/>
+            <a:endParaRPr lang="en-IN" sz="1300" dirty="0" smtClean="0">
+              <a:latin typeface="Adobe Gothic Std B" panose="020B0800000000000000" pitchFamily="34" charset="-128"/>
+              <a:ea typeface="Adobe Gothic Std B" panose="020B0800000000000000" pitchFamily="34" charset="-128"/>
+            </a:endParaRPr>
+          </a:p>
+          <a:p>
+            <a:pPr algn="ctr"/>
+            <a:endParaRPr lang="en-IN" sz="1300" dirty="0">
+              <a:latin typeface="Adobe Gothic Std B" panose="020B0800000000000000" pitchFamily="34" charset="-128"/>
+              <a:ea typeface="Adobe Gothic Std B" panose="020B0800000000000000" pitchFamily="34" charset="-128"/>
+            </a:endParaRPr>
+          </a:p>
+          <a:p>
+            <a:pPr algn="ctr"/>
+            <a:endParaRPr lang="en-IN" sz="1300" dirty="0">
+              <a:latin typeface="Adobe Gothic Std B" panose="020B0800000000000000" pitchFamily="34" charset="-128"/>
+              <a:ea typeface="Adobe Gothic Std B" panose="020B0800000000000000" pitchFamily="34" charset="-128"/>
+            </a:endParaRPr>
+          </a:p>
+          <a:p>
+            <a:pPr algn="ctr"/>
+            <a:r>
+              <a:rPr lang="en-IN" sz="1300" dirty="0" smtClean="0">
+                <a:latin typeface="Adobe Gothic Std B" panose="020B0800000000000000" pitchFamily="34" charset="-128"/>
+                <a:ea typeface="Adobe Gothic Std B" panose="020B0800000000000000" pitchFamily="34" charset="-128"/>
+              </a:rPr>
+              <a:t>Generate </a:t>
+            </a:r>
+            <a:r>
+              <a:rPr lang="en-IN" sz="1200" dirty="0" smtClean="0">
+                <a:latin typeface="Adobe Gothic Std B" panose="020B0800000000000000" pitchFamily="34" charset="-128"/>
+                <a:ea typeface="Adobe Gothic Std B" panose="020B0800000000000000" pitchFamily="34" charset="-128"/>
+              </a:rPr>
+              <a:t>random</a:t>
+            </a:r>
+            <a:r>
+              <a:rPr lang="en-IN" sz="1300" dirty="0" smtClean="0">
+                <a:latin typeface="Adobe Gothic Std B" panose="020B0800000000000000" pitchFamily="34" charset="-128"/>
+                <a:ea typeface="Adobe Gothic Std B" panose="020B0800000000000000" pitchFamily="34" charset="-128"/>
+              </a:rPr>
+              <a:t> passwords</a:t>
+            </a:r>
+            <a:endParaRPr lang="en-IN" sz="1300" dirty="0">
+              <a:latin typeface="Adobe Gothic Std B" panose="020B0800000000000000" pitchFamily="34" charset="-128"/>
+              <a:ea typeface="Adobe Gothic Std B" panose="020B0800000000000000" pitchFamily="34" charset="-128"/>
+            </a:endParaRPr>
+          </a:p>
+        </p:txBody>
+      </p:sp>
       <p:pic>
         <p:nvPicPr>
-          <p:cNvPr id="21" name="Picture 20"/>
+          <p:cNvPr id="7" name="Picture 6"/>
+          <p:cNvPicPr>
+            <a:picLocks noChangeAspect="1"/>
+          </p:cNvPicPr>
+          <p:nvPr/>
+        </p:nvPicPr>
+        <p:blipFill rotWithShape="1">
+          <a:blip r:embed="rId2"/>
+          <a:srcRect t="7685"/>
+          <a:stretch/>
+        </p:blipFill>
+        <p:spPr>
+          <a:xfrm>
+            <a:off x="3126732" y="2576777"/>
+            <a:ext cx="1781286" cy="1038225"/>
+          </a:xfrm>
+          <a:prstGeom prst="rect">
+            <a:avLst/>
+          </a:prstGeom>
+        </p:spPr>
+      </p:pic>
+      <p:pic>
+        <p:nvPicPr>
+          <p:cNvPr id="8" name="Picture 7"/>
+          <p:cNvPicPr>
+            <a:picLocks noChangeAspect="1"/>
+          </p:cNvPicPr>
+          <p:nvPr/>
+        </p:nvPicPr>
+        <p:blipFill rotWithShape="1">
+          <a:blip r:embed="rId3"/>
+          <a:srcRect t="8544"/>
+          <a:stretch/>
+        </p:blipFill>
+        <p:spPr>
+          <a:xfrm>
+            <a:off x="5217074" y="2576777"/>
+            <a:ext cx="1781286" cy="1027092"/>
+          </a:xfrm>
+          <a:prstGeom prst="rect">
+            <a:avLst/>
+          </a:prstGeom>
+        </p:spPr>
+      </p:pic>
+      <p:pic>
+        <p:nvPicPr>
+          <p:cNvPr id="9" name="Picture 8"/>
+          <p:cNvPicPr>
+            <a:picLocks noChangeAspect="1"/>
+          </p:cNvPicPr>
+          <p:nvPr/>
+        </p:nvPicPr>
+        <p:blipFill rotWithShape="1">
+          <a:blip r:embed="rId4"/>
+          <a:srcRect t="5452"/>
+          <a:stretch/>
+        </p:blipFill>
+        <p:spPr>
+          <a:xfrm>
+            <a:off x="7318924" y="2576777"/>
+            <a:ext cx="1781286" cy="1027092"/>
+          </a:xfrm>
+          <a:prstGeom prst="rect">
+            <a:avLst/>
+          </a:prstGeom>
+        </p:spPr>
+      </p:pic>
+      <p:sp>
+        <p:nvSpPr>
+          <p:cNvPr id="10" name="Rectangle 9"/>
+          <p:cNvSpPr/>
+          <p:nvPr/>
+        </p:nvSpPr>
+        <p:spPr>
+          <a:xfrm>
+            <a:off x="3000375" y="4305805"/>
+            <a:ext cx="2034000" cy="1797270"/>
+          </a:xfrm>
+          <a:prstGeom prst="rect">
+            <a:avLst/>
+          </a:prstGeom>
+          <a:solidFill>
+            <a:schemeClr val="accent1">
+              <a:lumMod val="75000"/>
+            </a:schemeClr>
+          </a:solidFill>
+          <a:ln w="38100">
+            <a:solidFill>
+              <a:schemeClr val="accent1">
+                <a:lumMod val="50000"/>
+              </a:schemeClr>
+            </a:solidFill>
+          </a:ln>
+        </p:spPr>
+        <p:style>
+          <a:lnRef idx="2">
+            <a:schemeClr val="accent1">
+              <a:shade val="50000"/>
+            </a:schemeClr>
+          </a:lnRef>
+          <a:fillRef idx="1">
+            <a:schemeClr val="accent1"/>
+          </a:fillRef>
+          <a:effectRef idx="0">
+            <a:schemeClr val="accent1"/>
+          </a:effectRef>
+          <a:fontRef idx="minor">
+            <a:schemeClr val="lt1"/>
+          </a:fontRef>
+        </p:style>
+        <p:txBody>
+          <a:bodyPr rtlCol="0" anchor="ctr"/>
+          <a:lstStyle/>
+          <a:p>
+            <a:pPr algn="ctr"/>
+            <a:endParaRPr lang="en-IN" sz="1200" dirty="0" smtClean="0">
+              <a:latin typeface="Adobe Gothic Std B" panose="020B0800000000000000" pitchFamily="34" charset="-128"/>
+              <a:ea typeface="Adobe Gothic Std B" panose="020B0800000000000000" pitchFamily="34" charset="-128"/>
+            </a:endParaRPr>
+          </a:p>
+          <a:p>
+            <a:pPr algn="ctr"/>
+            <a:endParaRPr lang="en-IN" sz="1200" dirty="0" smtClean="0">
+              <a:latin typeface="Adobe Gothic Std B" panose="020B0800000000000000" pitchFamily="34" charset="-128"/>
+              <a:ea typeface="Adobe Gothic Std B" panose="020B0800000000000000" pitchFamily="34" charset="-128"/>
+            </a:endParaRPr>
+          </a:p>
+          <a:p>
+            <a:pPr algn="ctr"/>
+            <a:endParaRPr lang="en-IN" sz="1200" dirty="0">
+              <a:latin typeface="Adobe Gothic Std B" panose="020B0800000000000000" pitchFamily="34" charset="-128"/>
+              <a:ea typeface="Adobe Gothic Std B" panose="020B0800000000000000" pitchFamily="34" charset="-128"/>
+            </a:endParaRPr>
+          </a:p>
+          <a:p>
+            <a:pPr algn="ctr"/>
+            <a:endParaRPr lang="en-IN" sz="1200" dirty="0" smtClean="0">
+              <a:latin typeface="Adobe Gothic Std B" panose="020B0800000000000000" pitchFamily="34" charset="-128"/>
+              <a:ea typeface="Adobe Gothic Std B" panose="020B0800000000000000" pitchFamily="34" charset="-128"/>
+            </a:endParaRPr>
+          </a:p>
+          <a:p>
+            <a:pPr algn="ctr"/>
+            <a:endParaRPr lang="en-IN" sz="1200" dirty="0" smtClean="0">
+              <a:latin typeface="Adobe Gothic Std B" panose="020B0800000000000000" pitchFamily="34" charset="-128"/>
+              <a:ea typeface="Adobe Gothic Std B" panose="020B0800000000000000" pitchFamily="34" charset="-128"/>
+            </a:endParaRPr>
+          </a:p>
+          <a:p>
+            <a:pPr algn="ctr"/>
+            <a:endParaRPr lang="en-IN" sz="1200" dirty="0">
+              <a:latin typeface="Adobe Gothic Std B" panose="020B0800000000000000" pitchFamily="34" charset="-128"/>
+              <a:ea typeface="Adobe Gothic Std B" panose="020B0800000000000000" pitchFamily="34" charset="-128"/>
+            </a:endParaRPr>
+          </a:p>
+          <a:p>
+            <a:pPr algn="ctr"/>
+            <a:r>
+              <a:rPr lang="en-IN" sz="1200" dirty="0" smtClean="0">
+                <a:latin typeface="Adobe Gothic Std B" panose="020B0800000000000000" pitchFamily="34" charset="-128"/>
+                <a:ea typeface="Adobe Gothic Std B" panose="020B0800000000000000" pitchFamily="34" charset="-128"/>
+              </a:rPr>
+              <a:t>Find passwords by website or username</a:t>
+            </a:r>
+            <a:endParaRPr lang="en-IN" sz="1200" dirty="0">
+              <a:latin typeface="Adobe Gothic Std B" panose="020B0800000000000000" pitchFamily="34" charset="-128"/>
+              <a:ea typeface="Adobe Gothic Std B" panose="020B0800000000000000" pitchFamily="34" charset="-128"/>
+            </a:endParaRPr>
+          </a:p>
+        </p:txBody>
+      </p:sp>
+      <p:sp>
+        <p:nvSpPr>
+          <p:cNvPr id="11" name="Rectangle 10"/>
+          <p:cNvSpPr/>
+          <p:nvPr/>
+        </p:nvSpPr>
+        <p:spPr>
+          <a:xfrm>
+            <a:off x="7192567" y="4305805"/>
+            <a:ext cx="2034000" cy="1797270"/>
+          </a:xfrm>
+          <a:prstGeom prst="rect">
+            <a:avLst/>
+          </a:prstGeom>
+          <a:solidFill>
+            <a:schemeClr val="accent1">
+              <a:lumMod val="75000"/>
+            </a:schemeClr>
+          </a:solidFill>
+          <a:ln w="38100">
+            <a:solidFill>
+              <a:schemeClr val="accent1">
+                <a:lumMod val="50000"/>
+              </a:schemeClr>
+            </a:solidFill>
+          </a:ln>
+        </p:spPr>
+        <p:style>
+          <a:lnRef idx="2">
+            <a:schemeClr val="accent1">
+              <a:shade val="50000"/>
+            </a:schemeClr>
+          </a:lnRef>
+          <a:fillRef idx="1">
+            <a:schemeClr val="accent1"/>
+          </a:fillRef>
+          <a:effectRef idx="0">
+            <a:schemeClr val="accent1"/>
+          </a:effectRef>
+          <a:fontRef idx="minor">
+            <a:schemeClr val="lt1"/>
+          </a:fontRef>
+        </p:style>
+        <p:txBody>
+          <a:bodyPr rtlCol="0" anchor="ctr"/>
+          <a:lstStyle/>
+          <a:p>
+            <a:pPr algn="ctr"/>
+            <a:endParaRPr lang="en-IN" sz="1200" dirty="0">
+              <a:latin typeface="Adobe Gothic Std B" panose="020B0800000000000000" pitchFamily="34" charset="-128"/>
+              <a:ea typeface="Adobe Gothic Std B" panose="020B0800000000000000" pitchFamily="34" charset="-128"/>
+            </a:endParaRPr>
+          </a:p>
+          <a:p>
+            <a:pPr algn="ctr"/>
+            <a:endParaRPr lang="en-IN" sz="1200" dirty="0">
+              <a:latin typeface="Adobe Gothic Std B" panose="020B0800000000000000" pitchFamily="34" charset="-128"/>
+              <a:ea typeface="Adobe Gothic Std B" panose="020B0800000000000000" pitchFamily="34" charset="-128"/>
+            </a:endParaRPr>
+          </a:p>
+          <a:p>
+            <a:pPr algn="ctr"/>
+            <a:endParaRPr lang="en-IN" sz="1200" dirty="0">
+              <a:latin typeface="Adobe Gothic Std B" panose="020B0800000000000000" pitchFamily="34" charset="-128"/>
+              <a:ea typeface="Adobe Gothic Std B" panose="020B0800000000000000" pitchFamily="34" charset="-128"/>
+            </a:endParaRPr>
+          </a:p>
+          <a:p>
+            <a:pPr algn="ctr"/>
+            <a:endParaRPr lang="en-IN" sz="1200" dirty="0">
+              <a:latin typeface="Adobe Gothic Std B" panose="020B0800000000000000" pitchFamily="34" charset="-128"/>
+              <a:ea typeface="Adobe Gothic Std B" panose="020B0800000000000000" pitchFamily="34" charset="-128"/>
+            </a:endParaRPr>
+          </a:p>
+          <a:p>
+            <a:pPr algn="ctr"/>
+            <a:endParaRPr lang="en-IN" sz="1200" dirty="0">
+              <a:latin typeface="Adobe Gothic Std B" panose="020B0800000000000000" pitchFamily="34" charset="-128"/>
+              <a:ea typeface="Adobe Gothic Std B" panose="020B0800000000000000" pitchFamily="34" charset="-128"/>
+            </a:endParaRPr>
+          </a:p>
+          <a:p>
+            <a:pPr algn="ctr"/>
+            <a:endParaRPr lang="en-IN" sz="1200" dirty="0">
+              <a:latin typeface="Adobe Gothic Std B" panose="020B0800000000000000" pitchFamily="34" charset="-128"/>
+              <a:ea typeface="Adobe Gothic Std B" panose="020B0800000000000000" pitchFamily="34" charset="-128"/>
+            </a:endParaRPr>
+          </a:p>
+          <a:p>
+            <a:pPr algn="ctr"/>
+            <a:r>
+              <a:rPr lang="en-IN" sz="1200" dirty="0" smtClean="0">
+                <a:latin typeface="Adobe Gothic Std B" panose="020B0800000000000000" pitchFamily="34" charset="-128"/>
+                <a:ea typeface="Adobe Gothic Std B" panose="020B0800000000000000" pitchFamily="34" charset="-128"/>
+              </a:rPr>
+              <a:t>Select single/multiple rows and copy</a:t>
+            </a:r>
+            <a:endParaRPr lang="en-IN" sz="1200" dirty="0">
+              <a:latin typeface="Adobe Gothic Std B" panose="020B0800000000000000" pitchFamily="34" charset="-128"/>
+              <a:ea typeface="Adobe Gothic Std B" panose="020B0800000000000000" pitchFamily="34" charset="-128"/>
+            </a:endParaRPr>
+          </a:p>
+        </p:txBody>
+      </p:sp>
+      <p:sp>
+        <p:nvSpPr>
+          <p:cNvPr id="12" name="Rectangle 11"/>
+          <p:cNvSpPr/>
+          <p:nvPr/>
+        </p:nvSpPr>
+        <p:spPr>
+          <a:xfrm>
+            <a:off x="5090717" y="4305805"/>
+            <a:ext cx="2034000" cy="1797270"/>
+          </a:xfrm>
+          <a:prstGeom prst="rect">
+            <a:avLst/>
+          </a:prstGeom>
+          <a:solidFill>
+            <a:schemeClr val="accent1">
+              <a:lumMod val="75000"/>
+            </a:schemeClr>
+          </a:solidFill>
+          <a:ln w="38100">
+            <a:solidFill>
+              <a:schemeClr val="accent1">
+                <a:lumMod val="50000"/>
+              </a:schemeClr>
+            </a:solidFill>
+          </a:ln>
+        </p:spPr>
+        <p:style>
+          <a:lnRef idx="2">
+            <a:schemeClr val="accent1">
+              <a:shade val="50000"/>
+            </a:schemeClr>
+          </a:lnRef>
+          <a:fillRef idx="1">
+            <a:schemeClr val="accent1"/>
+          </a:fillRef>
+          <a:effectRef idx="0">
+            <a:schemeClr val="accent1"/>
+          </a:effectRef>
+          <a:fontRef idx="minor">
+            <a:schemeClr val="lt1"/>
+          </a:fontRef>
+        </p:style>
+        <p:txBody>
+          <a:bodyPr rtlCol="0" anchor="ctr"/>
+          <a:lstStyle/>
+          <a:p>
+            <a:pPr algn="ctr"/>
+            <a:endParaRPr lang="en-IN" sz="1300" dirty="0" smtClean="0">
+              <a:latin typeface="Adobe Gothic Std B" panose="020B0800000000000000" pitchFamily="34" charset="-128"/>
+              <a:ea typeface="Adobe Gothic Std B" panose="020B0800000000000000" pitchFamily="34" charset="-128"/>
+            </a:endParaRPr>
+          </a:p>
+          <a:p>
+            <a:pPr algn="ctr"/>
+            <a:endParaRPr lang="en-IN" sz="1300" dirty="0" smtClean="0">
+              <a:latin typeface="Adobe Gothic Std B" panose="020B0800000000000000" pitchFamily="34" charset="-128"/>
+              <a:ea typeface="Adobe Gothic Std B" panose="020B0800000000000000" pitchFamily="34" charset="-128"/>
+            </a:endParaRPr>
+          </a:p>
+          <a:p>
+            <a:pPr algn="ctr"/>
+            <a:endParaRPr lang="en-IN" sz="1300" dirty="0">
+              <a:latin typeface="Adobe Gothic Std B" panose="020B0800000000000000" pitchFamily="34" charset="-128"/>
+              <a:ea typeface="Adobe Gothic Std B" panose="020B0800000000000000" pitchFamily="34" charset="-128"/>
+            </a:endParaRPr>
+          </a:p>
+          <a:p>
+            <a:pPr algn="ctr"/>
+            <a:endParaRPr lang="en-IN" sz="1300" dirty="0" smtClean="0">
+              <a:latin typeface="Adobe Gothic Std B" panose="020B0800000000000000" pitchFamily="34" charset="-128"/>
+              <a:ea typeface="Adobe Gothic Std B" panose="020B0800000000000000" pitchFamily="34" charset="-128"/>
+            </a:endParaRPr>
+          </a:p>
+          <a:p>
+            <a:pPr algn="ctr"/>
+            <a:endParaRPr lang="en-IN" sz="1300" dirty="0">
+              <a:latin typeface="Adobe Gothic Std B" panose="020B0800000000000000" pitchFamily="34" charset="-128"/>
+              <a:ea typeface="Adobe Gothic Std B" panose="020B0800000000000000" pitchFamily="34" charset="-128"/>
+            </a:endParaRPr>
+          </a:p>
+          <a:p>
+            <a:pPr algn="ctr"/>
+            <a:endParaRPr lang="en-IN" sz="1300" dirty="0">
+              <a:latin typeface="Adobe Gothic Std B" panose="020B0800000000000000" pitchFamily="34" charset="-128"/>
+              <a:ea typeface="Adobe Gothic Std B" panose="020B0800000000000000" pitchFamily="34" charset="-128"/>
+            </a:endParaRPr>
+          </a:p>
+          <a:p>
+            <a:pPr algn="ctr"/>
+            <a:r>
+              <a:rPr lang="en-IN" sz="1300" dirty="0" smtClean="0">
+                <a:latin typeface="Adobe Gothic Std B" panose="020B0800000000000000" pitchFamily="34" charset="-128"/>
+                <a:ea typeface="Adobe Gothic Std B" panose="020B0800000000000000" pitchFamily="34" charset="-128"/>
+              </a:rPr>
+              <a:t>Log will keep all your activities</a:t>
+            </a:r>
+            <a:endParaRPr lang="en-IN" sz="1300" dirty="0">
+              <a:latin typeface="Adobe Gothic Std B" panose="020B0800000000000000" pitchFamily="34" charset="-128"/>
+              <a:ea typeface="Adobe Gothic Std B" panose="020B0800000000000000" pitchFamily="34" charset="-128"/>
+            </a:endParaRPr>
+          </a:p>
+        </p:txBody>
+      </p:sp>
+      <p:pic>
+        <p:nvPicPr>
+          <p:cNvPr id="16" name="Picture 15"/>
+          <p:cNvPicPr>
+            <a:picLocks noChangeAspect="1"/>
+          </p:cNvPicPr>
+          <p:nvPr/>
+        </p:nvPicPr>
+        <p:blipFill rotWithShape="1">
+          <a:blip r:embed="rId5"/>
+          <a:srcRect t="15399"/>
+          <a:stretch/>
+        </p:blipFill>
+        <p:spPr>
+          <a:xfrm>
+            <a:off x="3126732" y="4433474"/>
+            <a:ext cx="1781286" cy="1031166"/>
+          </a:xfrm>
+          <a:prstGeom prst="rect">
+            <a:avLst/>
+          </a:prstGeom>
+        </p:spPr>
+      </p:pic>
+      <p:pic>
+        <p:nvPicPr>
+          <p:cNvPr id="17" name="Picture 16"/>
+          <p:cNvPicPr>
+            <a:picLocks noChangeAspect="1"/>
+          </p:cNvPicPr>
+          <p:nvPr/>
+        </p:nvPicPr>
+        <p:blipFill rotWithShape="1">
+          <a:blip r:embed="rId6"/>
+          <a:srcRect b="12702"/>
+          <a:stretch/>
+        </p:blipFill>
+        <p:spPr>
+          <a:xfrm>
+            <a:off x="5217074" y="4433474"/>
+            <a:ext cx="1781286" cy="1031165"/>
+          </a:xfrm>
+          <a:prstGeom prst="rect">
+            <a:avLst/>
+          </a:prstGeom>
+        </p:spPr>
+      </p:pic>
+      <p:sp>
+        <p:nvSpPr>
+          <p:cNvPr id="24" name="TextBox 23"/>
+          <p:cNvSpPr txBox="1"/>
+          <p:nvPr/>
+        </p:nvSpPr>
+        <p:spPr>
+          <a:xfrm>
+            <a:off x="4348767" y="1595531"/>
+            <a:ext cx="3517899" cy="707886"/>
+          </a:xfrm>
+          <a:prstGeom prst="rect">
+            <a:avLst/>
+          </a:prstGeom>
+          <a:noFill/>
+        </p:spPr>
+        <p:txBody>
+          <a:bodyPr wrap="square" rtlCol="0">
+            <a:spAutoFit/>
+          </a:bodyPr>
+          <a:lstStyle/>
+          <a:p>
+            <a:pPr algn="ctr"/>
+            <a:r>
+              <a:rPr lang="en-IN" sz="2000" dirty="0" smtClean="0">
+                <a:solidFill>
+                  <a:schemeClr val="bg1"/>
+                </a:solidFill>
+                <a:latin typeface="Adobe Gothic Std B" panose="020B0800000000000000" pitchFamily="34" charset="-128"/>
+                <a:ea typeface="Adobe Gothic Std B" panose="020B0800000000000000" pitchFamily="34" charset="-128"/>
+              </a:rPr>
+              <a:t>Welcome to Asterisk*</a:t>
+            </a:r>
+          </a:p>
+          <a:p>
+            <a:pPr algn="ctr"/>
+            <a:r>
+              <a:rPr lang="en-IN" sz="2000" dirty="0" smtClean="0">
+                <a:solidFill>
+                  <a:schemeClr val="bg1"/>
+                </a:solidFill>
+                <a:latin typeface="Adobe Gothic Std B" panose="020B0800000000000000" pitchFamily="34" charset="-128"/>
+                <a:ea typeface="Adobe Gothic Std B" panose="020B0800000000000000" pitchFamily="34" charset="-128"/>
+              </a:rPr>
+              <a:t>Glad to have you here!</a:t>
+            </a:r>
+          </a:p>
+        </p:txBody>
+      </p:sp>
+      <p:pic>
+        <p:nvPicPr>
+          <p:cNvPr id="25" name="Picture 24"/>
           <p:cNvPicPr>
             <a:picLocks noChangeAspect="1"/>
           </p:cNvPicPr>
           <p:nvPr/>
         </p:nvPicPr>
         <p:blipFill>
-          <a:blip r:embed="rId32" cstate="print">
-            <a:lum bright="70000" contrast="-70000"/>
-            <a:extLst>
-              <a:ext uri="{BEBA8EAE-BF5A-486C-A8C5-ECC9F3942E4B}">
-                <a14:imgProps xmlns:a14="http://schemas.microsoft.com/office/drawing/2010/main">
-                  <a14:imgLayer r:embed="rId33">
-                    <a14:imgEffect>
-                      <a14:artisticPhotocopy/>
-                    </a14:imgEffect>
-                  </a14:imgLayer>
-                </a14:imgProps>
-              </a:ext>
-              <a:ext uri="{28A0092B-C50C-407E-A947-70E740481C1C}">
-                <a14:useLocalDpi xmlns:a14="http://schemas.microsoft.com/office/drawing/2010/main" val="0"/>
-              </a:ext>
-            </a:extLst>
-          </a:blip>
-          <a:stretch>
-            <a:fillRect/>
-          </a:stretch>
-        </p:blipFill>
-        <p:spPr>
-          <a:xfrm>
-            <a:off x="4209820" y="2188954"/>
-            <a:ext cx="109743" cy="144129"/>
-          </a:xfrm>
-          <a:prstGeom prst="rect">
-            <a:avLst/>
-          </a:prstGeom>
-        </p:spPr>
-      </p:pic>
-      <p:pic>
-        <p:nvPicPr>
-          <p:cNvPr id="22" name="Picture 21"/>
-          <p:cNvPicPr>
-            <a:picLocks noChangeAspect="1"/>
-          </p:cNvPicPr>
-          <p:nvPr/>
-        </p:nvPicPr>
-        <p:blipFill>
-          <a:blip r:embed="rId34" cstate="print">
+          <a:blip r:embed="rId7">
             <a:extLst>
               <a:ext uri="{28A0092B-C50C-407E-A947-70E740481C1C}">
                 <a14:useLocalDpi xmlns:a14="http://schemas.microsoft.com/office/drawing/2010/main" val="0"/>
@@ -3837,35 +4783,55 @@
         </p:blipFill>
         <p:spPr>
           <a:xfrm>
-            <a:off x="3794669" y="2896406"/>
-            <a:ext cx="743994" cy="743994"/>
+            <a:off x="7313927" y="4433475"/>
+            <a:ext cx="1786283" cy="1031164"/>
           </a:xfrm>
           <a:prstGeom prst="rect">
             <a:avLst/>
           </a:prstGeom>
         </p:spPr>
       </p:pic>
+    </p:spTree>
+    <p:extLst>
+      <p:ext uri="{BB962C8B-B14F-4D97-AF65-F5344CB8AC3E}">
+        <p14:creationId xmlns:p14="http://schemas.microsoft.com/office/powerpoint/2010/main" val="41019712"/>
+      </p:ext>
+    </p:extLst>
+  </p:cSld>
+  <p:clrMapOvr>
+    <a:masterClrMapping/>
+  </p:clrMapOvr>
+</p:sld>
+</file>
+
+<file path=ppt/slides/slide4.xml><?xml version="1.0" encoding="utf-8"?>
+<p:sld xmlns:a="http://schemas.openxmlformats.org/drawingml/2006/main" xmlns:r="http://schemas.openxmlformats.org/officeDocument/2006/relationships" xmlns:p="http://schemas.openxmlformats.org/presentationml/2006/main">
+  <p:cSld>
+    <p:spTree>
+      <p:nvGrpSpPr>
+        <p:cNvPr id="1" name=""/>
+        <p:cNvGrpSpPr/>
+        <p:nvPr/>
+      </p:nvGrpSpPr>
+      <p:grpSpPr>
+        <a:xfrm>
+          <a:off x="0" y="0"/>
+          <a:ext cx="0" cy="0"/>
+          <a:chOff x="0" y="0"/>
+          <a:chExt cx="0" cy="0"/>
+        </a:xfrm>
+      </p:grpSpPr>
       <p:pic>
         <p:nvPicPr>
-          <p:cNvPr id="25" name="Picture 24"/>
+          <p:cNvPr id="2" name="Picture 1"/>
           <p:cNvPicPr>
             <a:picLocks noChangeAspect="1"/>
           </p:cNvPicPr>
           <p:nvPr/>
         </p:nvPicPr>
         <p:blipFill>
-          <a:blip r:embed="rId35" cstate="print">
-            <a:biLevel thresh="25000"/>
+          <a:blip r:embed="rId2">
             <a:extLst>
-              <a:ext uri="{BEBA8EAE-BF5A-486C-A8C5-ECC9F3942E4B}">
-                <a14:imgProps xmlns:a14="http://schemas.microsoft.com/office/drawing/2010/main">
-                  <a14:imgLayer r:embed="rId36">
-                    <a14:imgEffect>
-                      <a14:artisticPhotocopy/>
-                    </a14:imgEffect>
-                  </a14:imgLayer>
-                </a14:imgProps>
-              </a:ext>
               <a:ext uri="{28A0092B-C50C-407E-A947-70E740481C1C}">
                 <a14:useLocalDpi xmlns:a14="http://schemas.microsoft.com/office/drawing/2010/main" val="0"/>
               </a:ext>
@@ -3877,8 +4843,8 @@
         </p:blipFill>
         <p:spPr>
           <a:xfrm>
-            <a:off x="4930469" y="2803859"/>
-            <a:ext cx="847487" cy="847487"/>
+            <a:off x="3226256" y="1570993"/>
+            <a:ext cx="4950933" cy="3407407"/>
           </a:xfrm>
           <a:prstGeom prst="rect">
             <a:avLst/>
@@ -3887,25 +4853,15 @@
       </p:pic>
       <p:pic>
         <p:nvPicPr>
-          <p:cNvPr id="26" name="Picture 25"/>
+          <p:cNvPr id="3" name="Picture 2"/>
           <p:cNvPicPr>
             <a:picLocks noChangeAspect="1"/>
           </p:cNvPicPr>
           <p:nvPr/>
         </p:nvPicPr>
         <p:blipFill>
-          <a:blip r:embed="rId37" cstate="print">
-            <a:biLevel thresh="50000"/>
+          <a:blip r:embed="rId3">
             <a:extLst>
-              <a:ext uri="{BEBA8EAE-BF5A-486C-A8C5-ECC9F3942E4B}">
-                <a14:imgProps xmlns:a14="http://schemas.microsoft.com/office/drawing/2010/main">
-                  <a14:imgLayer r:embed="rId38">
-                    <a14:imgEffect>
-                      <a14:artisticPhotocopy/>
-                    </a14:imgEffect>
-                  </a14:imgLayer>
-                </a14:imgProps>
-              </a:ext>
               <a:ext uri="{28A0092B-C50C-407E-A947-70E740481C1C}">
                 <a14:useLocalDpi xmlns:a14="http://schemas.microsoft.com/office/drawing/2010/main" val="0"/>
               </a:ext>
@@ -3917,8 +4873,38 @@
         </p:blipFill>
         <p:spPr>
           <a:xfrm>
-            <a:off x="3861287" y="2195986"/>
-            <a:ext cx="150796" cy="134711"/>
+            <a:off x="6680655" y="2147409"/>
+            <a:ext cx="4669907" cy="3402491"/>
+          </a:xfrm>
+          <a:prstGeom prst="rect">
+            <a:avLst/>
+          </a:prstGeom>
+        </p:spPr>
+      </p:pic>
+      <p:pic>
+        <p:nvPicPr>
+          <p:cNvPr id="4" name="Picture 3"/>
+          <p:cNvPicPr>
+            <a:picLocks noChangeAspect="1"/>
+          </p:cNvPicPr>
+          <p:nvPr/>
+        </p:nvPicPr>
+        <p:blipFill>
+          <a:blip r:embed="rId4">
+            <a:extLst>
+              <a:ext uri="{28A0092B-C50C-407E-A947-70E740481C1C}">
+                <a14:useLocalDpi xmlns:a14="http://schemas.microsoft.com/office/drawing/2010/main" val="0"/>
+              </a:ext>
+            </a:extLst>
+          </a:blip>
+          <a:stretch>
+            <a:fillRect/>
+          </a:stretch>
+        </p:blipFill>
+        <p:spPr>
+          <a:xfrm>
+            <a:off x="3226256" y="1861659"/>
+            <a:ext cx="4669907" cy="3402491"/>
           </a:xfrm>
           <a:prstGeom prst="rect">
             <a:avLst/>
@@ -3928,7 +4914,7 @@
     </p:spTree>
     <p:extLst>
       <p:ext uri="{BB962C8B-B14F-4D97-AF65-F5344CB8AC3E}">
-        <p14:creationId xmlns:p14="http://schemas.microsoft.com/office/powerpoint/2010/main" val="649731860"/>
+        <p14:creationId xmlns:p14="http://schemas.microsoft.com/office/powerpoint/2010/main" val="77830552"/>
       </p:ext>
     </p:extLst>
   </p:cSld>

</xml_diff>